<commit_message>
Avanzo un poco lo que podemos decir en la presentación.
</commit_message>
<xml_diff>
--- a/TODOMUNDO/presentacion.pptx
+++ b/TODOMUNDO/presentacion.pptx
@@ -10,12 +10,13 @@
     <p:sldId id="259" r:id="rId4"/>
     <p:sldId id="261" r:id="rId5"/>
     <p:sldId id="268" r:id="rId6"/>
-    <p:sldId id="263" r:id="rId7"/>
-    <p:sldId id="269" r:id="rId8"/>
-    <p:sldId id="264" r:id="rId9"/>
-    <p:sldId id="265" r:id="rId10"/>
-    <p:sldId id="266" r:id="rId11"/>
-    <p:sldId id="267" r:id="rId12"/>
+    <p:sldId id="270" r:id="rId7"/>
+    <p:sldId id="263" r:id="rId8"/>
+    <p:sldId id="269" r:id="rId9"/>
+    <p:sldId id="264" r:id="rId10"/>
+    <p:sldId id="265" r:id="rId11"/>
+    <p:sldId id="266" r:id="rId12"/>
+    <p:sldId id="267" r:id="rId13"/>
   </p:sldIdLst>
   <p:sldSz cx="9144000" cy="6858000" type="screen4x3"/>
   <p:notesSz cx="6858000" cy="9144000"/>
@@ -424,7 +425,7 @@
             <a:fld id="{635D96E9-2F8C-4717-83E7-8CBC9BFC8E60}" type="datetimeFigureOut">
               <a:rPr lang="es-AR" smtClean="0"/>
               <a:pPr/>
-              <a:t>26/11/2009</a:t>
+              <a:t>30/11/2009</a:t>
             </a:fld>
             <a:endParaRPr lang="es-AR"/>
           </a:p>
@@ -611,7 +612,7 @@
             <a:fld id="{635D96E9-2F8C-4717-83E7-8CBC9BFC8E60}" type="datetimeFigureOut">
               <a:rPr lang="es-AR" smtClean="0"/>
               <a:pPr/>
-              <a:t>26/11/2009</a:t>
+              <a:t>30/11/2009</a:t>
             </a:fld>
             <a:endParaRPr lang="es-AR"/>
           </a:p>
@@ -798,7 +799,7 @@
             <a:fld id="{635D96E9-2F8C-4717-83E7-8CBC9BFC8E60}" type="datetimeFigureOut">
               <a:rPr lang="es-AR" smtClean="0"/>
               <a:pPr/>
-              <a:t>26/11/2009</a:t>
+              <a:t>30/11/2009</a:t>
             </a:fld>
             <a:endParaRPr lang="es-AR"/>
           </a:p>
@@ -985,7 +986,7 @@
             <a:fld id="{635D96E9-2F8C-4717-83E7-8CBC9BFC8E60}" type="datetimeFigureOut">
               <a:rPr lang="es-AR" smtClean="0"/>
               <a:pPr/>
-              <a:t>26/11/2009</a:t>
+              <a:t>30/11/2009</a:t>
             </a:fld>
             <a:endParaRPr lang="es-AR"/>
           </a:p>
@@ -1368,7 +1369,7 @@
             <a:fld id="{635D96E9-2F8C-4717-83E7-8CBC9BFC8E60}" type="datetimeFigureOut">
               <a:rPr lang="es-AR" smtClean="0"/>
               <a:pPr/>
-              <a:t>26/11/2009</a:t>
+              <a:t>30/11/2009</a:t>
             </a:fld>
             <a:endParaRPr lang="es-AR"/>
           </a:p>
@@ -1639,7 +1640,7 @@
             <a:fld id="{635D96E9-2F8C-4717-83E7-8CBC9BFC8E60}" type="datetimeFigureOut">
               <a:rPr lang="es-AR" smtClean="0"/>
               <a:pPr/>
-              <a:t>26/11/2009</a:t>
+              <a:t>30/11/2009</a:t>
             </a:fld>
             <a:endParaRPr lang="es-AR"/>
           </a:p>
@@ -2026,7 +2027,7 @@
             <a:fld id="{635D96E9-2F8C-4717-83E7-8CBC9BFC8E60}" type="datetimeFigureOut">
               <a:rPr lang="es-AR" smtClean="0"/>
               <a:pPr/>
-              <a:t>26/11/2009</a:t>
+              <a:t>30/11/2009</a:t>
             </a:fld>
             <a:endParaRPr lang="es-AR"/>
           </a:p>
@@ -2149,7 +2150,7 @@
             <a:fld id="{635D96E9-2F8C-4717-83E7-8CBC9BFC8E60}" type="datetimeFigureOut">
               <a:rPr lang="es-AR" smtClean="0"/>
               <a:pPr/>
-              <a:t>26/11/2009</a:t>
+              <a:t>30/11/2009</a:t>
             </a:fld>
             <a:endParaRPr lang="es-AR"/>
           </a:p>
@@ -2331,7 +2332,7 @@
             <a:fld id="{635D96E9-2F8C-4717-83E7-8CBC9BFC8E60}" type="datetimeFigureOut">
               <a:rPr lang="es-AR" smtClean="0"/>
               <a:pPr/>
-              <a:t>26/11/2009</a:t>
+              <a:t>30/11/2009</a:t>
             </a:fld>
             <a:endParaRPr lang="es-AR"/>
           </a:p>
@@ -2667,7 +2668,7 @@
             <a:fld id="{635D96E9-2F8C-4717-83E7-8CBC9BFC8E60}" type="datetimeFigureOut">
               <a:rPr lang="es-AR" smtClean="0"/>
               <a:pPr/>
-              <a:t>26/11/2009</a:t>
+              <a:t>30/11/2009</a:t>
             </a:fld>
             <a:endParaRPr lang="es-AR"/>
           </a:p>
@@ -3038,7 +3039,7 @@
             <a:fld id="{635D96E9-2F8C-4717-83E7-8CBC9BFC8E60}" type="datetimeFigureOut">
               <a:rPr lang="es-AR" smtClean="0"/>
               <a:pPr/>
-              <a:t>26/11/2009</a:t>
+              <a:t>30/11/2009</a:t>
             </a:fld>
             <a:endParaRPr lang="es-AR"/>
           </a:p>
@@ -3458,7 +3459,7 @@
             <a:fld id="{635D96E9-2F8C-4717-83E7-8CBC9BFC8E60}" type="datetimeFigureOut">
               <a:rPr lang="es-AR" smtClean="0"/>
               <a:pPr/>
-              <a:t>26/11/2009</a:t>
+              <a:t>30/11/2009</a:t>
             </a:fld>
             <a:endParaRPr lang="es-AR"/>
           </a:p>
@@ -4073,7 +4074,7 @@
           <a:p>
             <a:r>
               <a:rPr lang="es-MX" dirty="0" smtClean="0"/>
-              <a:t>DIAGRAMA DE ESTADOS</a:t>
+              <a:t>MODELO DE OBJETOS</a:t>
             </a:r>
             <a:endParaRPr lang="es-AR" dirty="0"/>
           </a:p>
@@ -4094,7 +4095,23 @@
           <a:bodyPr/>
           <a:lstStyle/>
           <a:p>
-            <a:endParaRPr lang="es-AR"/>
+            <a:r>
+              <a:rPr lang="es-MX" dirty="0" smtClean="0"/>
+              <a:t>Sólo clases de entidad</a:t>
+            </a:r>
+          </a:p>
+          <a:p>
+            <a:pPr lvl="1"/>
+            <a:r>
+              <a:rPr lang="es-MX" dirty="0" smtClean="0"/>
+              <a:t>No de control</a:t>
+            </a:r>
+          </a:p>
+          <a:p>
+            <a:r>
+              <a:rPr lang="es-MX" dirty="0" smtClean="0"/>
+              <a:t>Clases de asociación deben contener información intrínseca</a:t>
+            </a:r>
           </a:p>
         </p:txBody>
       </p:sp>
@@ -4140,6 +4157,73 @@
           <a:p>
             <a:r>
               <a:rPr lang="es-MX" dirty="0" smtClean="0"/>
+              <a:t>DIAGRAMA DE ESTADOS</a:t>
+            </a:r>
+            <a:endParaRPr lang="es-AR" dirty="0"/>
+          </a:p>
+        </p:txBody>
+      </p:sp>
+      <p:sp>
+        <p:nvSpPr>
+          <p:cNvPr id="3" name="2 Marcador de contenido"/>
+          <p:cNvSpPr>
+            <a:spLocks noGrp="1"/>
+          </p:cNvSpPr>
+          <p:nvPr>
+            <p:ph idx="1"/>
+          </p:nvPr>
+        </p:nvSpPr>
+        <p:spPr/>
+        <p:txBody>
+          <a:bodyPr/>
+          <a:lstStyle/>
+          <a:p>
+            <a:endParaRPr lang="es-AR"/>
+          </a:p>
+        </p:txBody>
+      </p:sp>
+    </p:spTree>
+  </p:cSld>
+  <p:clrMapOvr>
+    <a:masterClrMapping/>
+  </p:clrMapOvr>
+</p:sld>
+</file>
+
+<file path=ppt/slides/slide12.xml><?xml version="1.0" encoding="utf-8"?>
+<p:sld xmlns:a="http://schemas.openxmlformats.org/drawingml/2006/main" xmlns:r="http://schemas.openxmlformats.org/officeDocument/2006/relationships" xmlns:p="http://schemas.openxmlformats.org/presentationml/2006/main">
+  <p:cSld>
+    <p:spTree>
+      <p:nvGrpSpPr>
+        <p:cNvPr id="1" name=""/>
+        <p:cNvGrpSpPr/>
+        <p:nvPr/>
+      </p:nvGrpSpPr>
+      <p:grpSpPr>
+        <a:xfrm>
+          <a:off x="0" y="0"/>
+          <a:ext cx="0" cy="0"/>
+          <a:chOff x="0" y="0"/>
+          <a:chExt cx="0" cy="0"/>
+        </a:xfrm>
+      </p:grpSpPr>
+      <p:sp>
+        <p:nvSpPr>
+          <p:cNvPr id="2" name="1 Título"/>
+          <p:cNvSpPr>
+            <a:spLocks noGrp="1"/>
+          </p:cNvSpPr>
+          <p:nvPr>
+            <p:ph type="title"/>
+          </p:nvPr>
+        </p:nvSpPr>
+        <p:spPr/>
+        <p:txBody>
+          <a:bodyPr/>
+          <a:lstStyle/>
+          <a:p>
+            <a:r>
+              <a:rPr lang="es-MX" dirty="0" smtClean="0"/>
               <a:t>CONCLUSIONES</a:t>
             </a:r>
             <a:endParaRPr lang="es-AR" dirty="0"/>
@@ -4468,8 +4552,8 @@
         </p:nvSpPr>
         <p:spPr>
           <a:xfrm>
-            <a:off x="502920" y="2678901"/>
-            <a:ext cx="8183880" cy="1500198"/>
+            <a:off x="502920" y="2411009"/>
+            <a:ext cx="8183880" cy="2035983"/>
           </a:xfrm>
         </p:spPr>
         <p:txBody>
@@ -4480,8 +4564,23 @@
           <a:p>
             <a:r>
               <a:rPr lang="es-MX" dirty="0" smtClean="0"/>
-              <a:t>Relativas al dominio del problema</a:t>
-            </a:r>
+              <a:t>En relación </a:t>
+            </a:r>
+            <a:r>
+              <a:rPr lang="es-MX" dirty="0" smtClean="0"/>
+              <a:t>al dominio del </a:t>
+            </a:r>
+            <a:r>
+              <a:rPr lang="es-MX" dirty="0" smtClean="0"/>
+              <a:t>problema</a:t>
+            </a:r>
+          </a:p>
+          <a:p>
+            <a:r>
+              <a:rPr lang="es-MX" dirty="0" smtClean="0"/>
+              <a:t>Verosimilitud</a:t>
+            </a:r>
+            <a:endParaRPr lang="es-MX" dirty="0" smtClean="0"/>
           </a:p>
           <a:p>
             <a:r>
@@ -4541,7 +4640,11 @@
           <a:p>
             <a:r>
               <a:rPr lang="es-MX" dirty="0" smtClean="0"/>
-              <a:t>HIPÓTESIS PRINCIPALES</a:t>
+              <a:t>HIPÓTESIS </a:t>
+            </a:r>
+            <a:r>
+              <a:rPr lang="es-MX" dirty="0" smtClean="0"/>
+              <a:t>PRINCIPALES (I)</a:t>
             </a:r>
             <a:endParaRPr lang="es-AR" dirty="0"/>
           </a:p>
@@ -4559,8 +4662,8 @@
         </p:nvSpPr>
         <p:spPr>
           <a:xfrm>
-            <a:off x="502920" y="1336734"/>
-            <a:ext cx="8183880" cy="4184532"/>
+            <a:off x="502920" y="1959380"/>
+            <a:ext cx="8183880" cy="2939240"/>
           </a:xfrm>
         </p:spPr>
         <p:txBody>
@@ -4569,32 +4672,37 @@
           <a:p>
             <a:r>
               <a:rPr lang="es-MX" dirty="0" smtClean="0"/>
-              <a:t>Reglamentaciones y trámites aduaneros a cargo de terceros</a:t>
-            </a:r>
-          </a:p>
-          <a:p>
-            <a:r>
-              <a:rPr lang="es-MX" dirty="0" smtClean="0"/>
-              <a:t>Existencia de clientes prioritarios ante sobreventas</a:t>
-            </a:r>
-          </a:p>
-          <a:p>
-            <a:r>
-              <a:rPr lang="es-MX" dirty="0" smtClean="0"/>
-              <a:t>Indemnizaciones por cuenta de empresas </a:t>
-            </a:r>
-            <a:r>
-              <a:rPr lang="es-MX" dirty="0" err="1" smtClean="0"/>
-              <a:t>tercerizadas</a:t>
+              <a:t>Uso de </a:t>
+            </a:r>
+            <a:r>
+              <a:rPr lang="es-MX" dirty="0" smtClean="0"/>
+              <a:t>moneda </a:t>
+            </a:r>
+            <a:r>
+              <a:rPr lang="es-MX" dirty="0" smtClean="0"/>
+              <a:t>única</a:t>
+            </a:r>
+          </a:p>
+          <a:p>
+            <a:r>
+              <a:rPr lang="es-MX" dirty="0" smtClean="0"/>
+              <a:t>Reglamentaciones </a:t>
+            </a:r>
+            <a:r>
+              <a:rPr lang="es-MX" dirty="0" smtClean="0"/>
+              <a:t>y trámites aduaneros a cargo de terceros</a:t>
+            </a:r>
+          </a:p>
+          <a:p>
+            <a:r>
+              <a:rPr lang="es-MX" dirty="0" smtClean="0"/>
+              <a:t>Existencia de clientes prioritarios ante </a:t>
+            </a:r>
+            <a:r>
+              <a:rPr lang="es-MX" dirty="0" smtClean="0"/>
+              <a:t>sobreventas</a:t>
             </a:r>
             <a:endParaRPr lang="es-MX" dirty="0" smtClean="0"/>
-          </a:p>
-          <a:p>
-            <a:r>
-              <a:rPr lang="es-MX" dirty="0" smtClean="0"/>
-              <a:t>Itinerarios variables para igual origen y destino</a:t>
-            </a:r>
-            <a:endParaRPr lang="es-AR" dirty="0" smtClean="0"/>
           </a:p>
         </p:txBody>
       </p:sp>
@@ -4635,12 +4743,18 @@
         </p:nvSpPr>
         <p:spPr/>
         <p:txBody>
-          <a:bodyPr/>
+          <a:bodyPr>
+            <a:normAutofit/>
+          </a:bodyPr>
           <a:lstStyle/>
           <a:p>
             <a:r>
               <a:rPr lang="es-MX" dirty="0" smtClean="0"/>
-              <a:t>ACTORES Y CASOS DE USO</a:t>
+              <a:t>HIPÓTESIS </a:t>
+            </a:r>
+            <a:r>
+              <a:rPr lang="es-MX" dirty="0" smtClean="0"/>
+              <a:t>PRINCIPALES (II)</a:t>
             </a:r>
             <a:endParaRPr lang="es-AR" dirty="0"/>
           </a:p>
@@ -4658,8 +4772,8 @@
         </p:nvSpPr>
         <p:spPr>
           <a:xfrm>
-            <a:off x="502920" y="2694190"/>
-            <a:ext cx="8183880" cy="1469620"/>
+            <a:off x="502920" y="2209413"/>
+            <a:ext cx="8183880" cy="2439174"/>
           </a:xfrm>
         </p:spPr>
         <p:txBody>
@@ -4668,18 +4782,24 @@
           <a:p>
             <a:r>
               <a:rPr lang="es-MX" dirty="0" smtClean="0"/>
-              <a:t>Actores de Análisis</a:t>
-            </a:r>
-          </a:p>
-          <a:p>
-            <a:pPr lvl="1"/>
-            <a:r>
-              <a:rPr lang="es-MX" dirty="0" smtClean="0"/>
-              <a:t>No operadores ni intermediarios</a:t>
-            </a:r>
-          </a:p>
-          <a:p>
+              <a:t>Indemnizaciones </a:t>
+            </a:r>
+            <a:r>
+              <a:rPr lang="es-MX" dirty="0" smtClean="0"/>
+              <a:t>por cuenta de empresas </a:t>
+            </a:r>
+            <a:r>
+              <a:rPr lang="es-MX" dirty="0" err="1" smtClean="0"/>
+              <a:t>tercerizadas</a:t>
+            </a:r>
             <a:endParaRPr lang="es-MX" dirty="0" smtClean="0"/>
+          </a:p>
+          <a:p>
+            <a:r>
+              <a:rPr lang="es-MX" dirty="0" smtClean="0"/>
+              <a:t>Itinerarios variables para igual origen y destino</a:t>
+            </a:r>
+            <a:endParaRPr lang="es-AR" dirty="0" smtClean="0"/>
           </a:p>
         </p:txBody>
       </p:sp>
@@ -4720,14 +4840,12 @@
         </p:nvSpPr>
         <p:spPr/>
         <p:txBody>
-          <a:bodyPr>
-            <a:normAutofit/>
-          </a:bodyPr>
+          <a:bodyPr/>
           <a:lstStyle/>
           <a:p>
             <a:r>
               <a:rPr lang="es-MX" dirty="0" smtClean="0"/>
-              <a:t>CASOS DE USO</a:t>
+              <a:t>ACTORES Y CASOS DE USO</a:t>
             </a:r>
             <a:endParaRPr lang="es-AR" dirty="0"/>
           </a:p>
@@ -4745,8 +4863,8 @@
         </p:nvSpPr>
         <p:spPr>
           <a:xfrm>
-            <a:off x="502920" y="2051114"/>
-            <a:ext cx="8183880" cy="2755772"/>
+            <a:off x="502920" y="2694190"/>
+            <a:ext cx="8183880" cy="1469620"/>
           </a:xfrm>
         </p:spPr>
         <p:txBody>
@@ -4755,43 +4873,18 @@
           <a:p>
             <a:r>
               <a:rPr lang="es-MX" dirty="0" smtClean="0"/>
-              <a:t>Casos completos pero específicos</a:t>
+              <a:t>Actores de Análisis</a:t>
             </a:r>
           </a:p>
           <a:p>
             <a:pPr lvl="1"/>
             <a:r>
               <a:rPr lang="es-MX" dirty="0" smtClean="0"/>
-              <a:t>No exagerar el principio de completitud</a:t>
-            </a:r>
-          </a:p>
-          <a:p>
-            <a:r>
-              <a:rPr lang="es-MX" dirty="0" smtClean="0"/>
-              <a:t>Especificaciones claras</a:t>
-            </a:r>
-          </a:p>
-          <a:p>
-            <a:pPr lvl="1"/>
-            <a:r>
-              <a:rPr lang="es-MX" dirty="0" smtClean="0"/>
-              <a:t>No olvidar finalizar caso de uso</a:t>
-            </a:r>
-          </a:p>
-          <a:p>
-            <a:pPr lvl="1"/>
-            <a:r>
-              <a:rPr lang="es-MX" dirty="0" smtClean="0"/>
-              <a:t>Requerir correctamente ejecución de </a:t>
-            </a:r>
-            <a:r>
-              <a:rPr lang="es-MX" dirty="0" err="1" smtClean="0"/>
-              <a:t>subflujos</a:t>
-            </a:r>
-            <a:endParaRPr lang="es-AR" dirty="0" smtClean="0"/>
-          </a:p>
-          <a:p>
-            <a:endParaRPr lang="es-AR" dirty="0"/>
+              <a:t>No operadores ni intermediarios</a:t>
+            </a:r>
+          </a:p>
+          <a:p>
+            <a:endParaRPr lang="es-MX" dirty="0" smtClean="0"/>
           </a:p>
         </p:txBody>
       </p:sp>
@@ -4832,12 +4925,14 @@
         </p:nvSpPr>
         <p:spPr/>
         <p:txBody>
-          <a:bodyPr/>
+          <a:bodyPr>
+            <a:normAutofit/>
+          </a:bodyPr>
           <a:lstStyle/>
           <a:p>
             <a:r>
               <a:rPr lang="es-MX" dirty="0" smtClean="0"/>
-              <a:t>DIAGRAMAS DE SECUENCIA</a:t>
+              <a:t>CASOS DE USO</a:t>
             </a:r>
             <a:endParaRPr lang="es-AR" dirty="0"/>
           </a:p>
@@ -4853,21 +4948,55 @@
             <p:ph idx="1"/>
           </p:nvPr>
         </p:nvSpPr>
-        <p:spPr/>
+        <p:spPr>
+          <a:xfrm>
+            <a:off x="502920" y="2051114"/>
+            <a:ext cx="8183880" cy="2755772"/>
+          </a:xfrm>
+        </p:spPr>
         <p:txBody>
           <a:bodyPr/>
           <a:lstStyle/>
           <a:p>
             <a:r>
               <a:rPr lang="es-MX" dirty="0" smtClean="0"/>
-              <a:t>Nombres de mensajes descriptivos</a:t>
-            </a:r>
-          </a:p>
-          <a:p>
-            <a:r>
-              <a:rPr lang="es-MX" dirty="0" smtClean="0"/>
-              <a:t>Uso de bucles y condicionales</a:t>
-            </a:r>
+              <a:t>Casos completos pero específicos</a:t>
+            </a:r>
+          </a:p>
+          <a:p>
+            <a:pPr lvl="1"/>
+            <a:r>
+              <a:rPr lang="es-MX" dirty="0" smtClean="0"/>
+              <a:t>No exagerar el principio de completitud</a:t>
+            </a:r>
+          </a:p>
+          <a:p>
+            <a:r>
+              <a:rPr lang="es-MX" dirty="0" smtClean="0"/>
+              <a:t>Especificaciones claras</a:t>
+            </a:r>
+          </a:p>
+          <a:p>
+            <a:pPr lvl="1"/>
+            <a:r>
+              <a:rPr lang="es-MX" dirty="0" smtClean="0"/>
+              <a:t>No olvidar finalizar caso de uso</a:t>
+            </a:r>
+          </a:p>
+          <a:p>
+            <a:pPr lvl="1"/>
+            <a:r>
+              <a:rPr lang="es-MX" dirty="0" smtClean="0"/>
+              <a:t>Requerir correctamente ejecución de </a:t>
+            </a:r>
+            <a:r>
+              <a:rPr lang="es-MX" dirty="0" err="1" smtClean="0"/>
+              <a:t>subflujos</a:t>
+            </a:r>
+            <a:endParaRPr lang="es-AR" dirty="0" smtClean="0"/>
+          </a:p>
+          <a:p>
+            <a:endParaRPr lang="es-AR" dirty="0"/>
           </a:p>
         </p:txBody>
       </p:sp>
@@ -4913,7 +5042,7 @@
           <a:p>
             <a:r>
               <a:rPr lang="es-MX" dirty="0" smtClean="0"/>
-              <a:t>MODELO DE OBJETOS</a:t>
+              <a:t>DIAGRAMAS DE SECUENCIA</a:t>
             </a:r>
             <a:endParaRPr lang="es-AR" dirty="0"/>
           </a:p>
@@ -4936,20 +5065,13 @@
           <a:p>
             <a:r>
               <a:rPr lang="es-MX" dirty="0" smtClean="0"/>
-              <a:t>Sólo clases de entidad</a:t>
-            </a:r>
-          </a:p>
-          <a:p>
-            <a:pPr lvl="1"/>
-            <a:r>
-              <a:rPr lang="es-MX" dirty="0" smtClean="0"/>
-              <a:t>No de control</a:t>
-            </a:r>
-          </a:p>
-          <a:p>
-            <a:r>
-              <a:rPr lang="es-MX" dirty="0" smtClean="0"/>
-              <a:t>Clases de asociación deben contener información intrínseca</a:t>
+              <a:t>Nombres de mensajes descriptivos</a:t>
+            </a:r>
+          </a:p>
+          <a:p>
+            <a:r>
+              <a:rPr lang="es-MX" dirty="0" smtClean="0"/>
+              <a:t>Uso de bucles y condicionales</a:t>
             </a:r>
           </a:p>
         </p:txBody>

</xml_diff>

<commit_message>
subo la presentación que mandó Tomy por mail
</commit_message>
<xml_diff>
--- a/TODOMUNDO/presentacion.pptx
+++ b/TODOMUNDO/presentacion.pptx
@@ -10,11 +10,11 @@
     <p:sldId id="259" r:id="rId4"/>
     <p:sldId id="261" r:id="rId5"/>
     <p:sldId id="268" r:id="rId6"/>
-    <p:sldId id="270" r:id="rId7"/>
-    <p:sldId id="263" r:id="rId8"/>
+    <p:sldId id="272" r:id="rId7"/>
+    <p:sldId id="271" r:id="rId8"/>
     <p:sldId id="269" r:id="rId9"/>
-    <p:sldId id="264" r:id="rId10"/>
-    <p:sldId id="265" r:id="rId11"/>
+    <p:sldId id="265" r:id="rId10"/>
+    <p:sldId id="264" r:id="rId11"/>
     <p:sldId id="266" r:id="rId12"/>
     <p:sldId id="267" r:id="rId13"/>
   </p:sldIdLst>
@@ -425,7 +425,7 @@
             <a:fld id="{635D96E9-2F8C-4717-83E7-8CBC9BFC8E60}" type="datetimeFigureOut">
               <a:rPr lang="es-AR" smtClean="0"/>
               <a:pPr/>
-              <a:t>30/11/2009</a:t>
+              <a:t>08/12/2009</a:t>
             </a:fld>
             <a:endParaRPr lang="es-AR"/>
           </a:p>
@@ -612,7 +612,7 @@
             <a:fld id="{635D96E9-2F8C-4717-83E7-8CBC9BFC8E60}" type="datetimeFigureOut">
               <a:rPr lang="es-AR" smtClean="0"/>
               <a:pPr/>
-              <a:t>30/11/2009</a:t>
+              <a:t>08/12/2009</a:t>
             </a:fld>
             <a:endParaRPr lang="es-AR"/>
           </a:p>
@@ -799,7 +799,7 @@
             <a:fld id="{635D96E9-2F8C-4717-83E7-8CBC9BFC8E60}" type="datetimeFigureOut">
               <a:rPr lang="es-AR" smtClean="0"/>
               <a:pPr/>
-              <a:t>30/11/2009</a:t>
+              <a:t>08/12/2009</a:t>
             </a:fld>
             <a:endParaRPr lang="es-AR"/>
           </a:p>
@@ -986,7 +986,7 @@
             <a:fld id="{635D96E9-2F8C-4717-83E7-8CBC9BFC8E60}" type="datetimeFigureOut">
               <a:rPr lang="es-AR" smtClean="0"/>
               <a:pPr/>
-              <a:t>30/11/2009</a:t>
+              <a:t>08/12/2009</a:t>
             </a:fld>
             <a:endParaRPr lang="es-AR"/>
           </a:p>
@@ -1369,7 +1369,7 @@
             <a:fld id="{635D96E9-2F8C-4717-83E7-8CBC9BFC8E60}" type="datetimeFigureOut">
               <a:rPr lang="es-AR" smtClean="0"/>
               <a:pPr/>
-              <a:t>30/11/2009</a:t>
+              <a:t>08/12/2009</a:t>
             </a:fld>
             <a:endParaRPr lang="es-AR"/>
           </a:p>
@@ -1640,7 +1640,7 @@
             <a:fld id="{635D96E9-2F8C-4717-83E7-8CBC9BFC8E60}" type="datetimeFigureOut">
               <a:rPr lang="es-AR" smtClean="0"/>
               <a:pPr/>
-              <a:t>30/11/2009</a:t>
+              <a:t>08/12/2009</a:t>
             </a:fld>
             <a:endParaRPr lang="es-AR"/>
           </a:p>
@@ -2027,7 +2027,7 @@
             <a:fld id="{635D96E9-2F8C-4717-83E7-8CBC9BFC8E60}" type="datetimeFigureOut">
               <a:rPr lang="es-AR" smtClean="0"/>
               <a:pPr/>
-              <a:t>30/11/2009</a:t>
+              <a:t>08/12/2009</a:t>
             </a:fld>
             <a:endParaRPr lang="es-AR"/>
           </a:p>
@@ -2150,7 +2150,7 @@
             <a:fld id="{635D96E9-2F8C-4717-83E7-8CBC9BFC8E60}" type="datetimeFigureOut">
               <a:rPr lang="es-AR" smtClean="0"/>
               <a:pPr/>
-              <a:t>30/11/2009</a:t>
+              <a:t>08/12/2009</a:t>
             </a:fld>
             <a:endParaRPr lang="es-AR"/>
           </a:p>
@@ -2332,7 +2332,7 @@
             <a:fld id="{635D96E9-2F8C-4717-83E7-8CBC9BFC8E60}" type="datetimeFigureOut">
               <a:rPr lang="es-AR" smtClean="0"/>
               <a:pPr/>
-              <a:t>30/11/2009</a:t>
+              <a:t>08/12/2009</a:t>
             </a:fld>
             <a:endParaRPr lang="es-AR"/>
           </a:p>
@@ -2668,7 +2668,7 @@
             <a:fld id="{635D96E9-2F8C-4717-83E7-8CBC9BFC8E60}" type="datetimeFigureOut">
               <a:rPr lang="es-AR" smtClean="0"/>
               <a:pPr/>
-              <a:t>30/11/2009</a:t>
+              <a:t>08/12/2009</a:t>
             </a:fld>
             <a:endParaRPr lang="es-AR"/>
           </a:p>
@@ -3039,7 +3039,7 @@
             <a:fld id="{635D96E9-2F8C-4717-83E7-8CBC9BFC8E60}" type="datetimeFigureOut">
               <a:rPr lang="es-AR" smtClean="0"/>
               <a:pPr/>
-              <a:t>30/11/2009</a:t>
+              <a:t>08/12/2009</a:t>
             </a:fld>
             <a:endParaRPr lang="es-AR"/>
           </a:p>
@@ -3459,7 +3459,7 @@
             <a:fld id="{635D96E9-2F8C-4717-83E7-8CBC9BFC8E60}" type="datetimeFigureOut">
               <a:rPr lang="es-AR" smtClean="0"/>
               <a:pPr/>
-              <a:t>30/11/2009</a:t>
+              <a:t>08/12/2009</a:t>
             </a:fld>
             <a:endParaRPr lang="es-AR"/>
           </a:p>
@@ -4037,6 +4037,13 @@
   <p:clrMapOvr>
     <a:masterClrMapping/>
   </p:clrMapOvr>
+  <p:timing>
+    <p:tnLst>
+      <p:par>
+        <p:cTn id="1" dur="indefinite" restart="never" nodeType="tmRoot"/>
+      </p:par>
+    </p:tnLst>
+  </p:timing>
 </p:sld>
 </file>
 
@@ -4069,12 +4076,14 @@
         </p:nvSpPr>
         <p:spPr/>
         <p:txBody>
-          <a:bodyPr/>
+          <a:bodyPr>
+            <a:normAutofit/>
+          </a:bodyPr>
           <a:lstStyle/>
           <a:p>
             <a:r>
-              <a:rPr lang="es-MX" dirty="0" smtClean="0"/>
-              <a:t>MODELO DE OBJETOS</a:t>
+              <a:rPr lang="es-AR" dirty="0" smtClean="0"/>
+              <a:t>MODELO DE INTERACCION.</a:t>
             </a:r>
             <a:endParaRPr lang="es-AR" dirty="0"/>
           </a:p>
@@ -4092,26 +4101,49 @@
         </p:nvSpPr>
         <p:spPr/>
         <p:txBody>
-          <a:bodyPr/>
+          <a:bodyPr>
+            <a:normAutofit/>
+          </a:bodyPr>
           <a:lstStyle/>
           <a:p>
             <a:r>
               <a:rPr lang="es-MX" dirty="0" smtClean="0"/>
-              <a:t>Sólo clases de entidad</a:t>
-            </a:r>
-          </a:p>
-          <a:p>
-            <a:pPr lvl="1"/>
-            <a:r>
-              <a:rPr lang="es-MX" dirty="0" smtClean="0"/>
-              <a:t>No de control</a:t>
-            </a:r>
-          </a:p>
-          <a:p>
-            <a:r>
-              <a:rPr lang="es-MX" dirty="0" smtClean="0"/>
-              <a:t>Clases de asociación deben contener información intrínseca</a:t>
-            </a:r>
+              <a:t>Indicar </a:t>
+            </a:r>
+            <a:r>
+              <a:rPr lang="es-MX" dirty="0" smtClean="0"/>
+              <a:t>escenarios concretos</a:t>
+            </a:r>
+          </a:p>
+          <a:p>
+            <a:r>
+              <a:rPr lang="es-MX" dirty="0" smtClean="0"/>
+              <a:t>Verificar las relaciones existente entre clases del modelo</a:t>
+            </a:r>
+          </a:p>
+          <a:p>
+            <a:r>
+              <a:rPr lang="es-MX" dirty="0" smtClean="0"/>
+              <a:t>Nombres de mensajes descriptivos</a:t>
+            </a:r>
+          </a:p>
+          <a:p>
+            <a:r>
+              <a:rPr lang="es-MX" dirty="0" smtClean="0"/>
+              <a:t>Uso de bucles y condicionales</a:t>
+            </a:r>
+          </a:p>
+          <a:p>
+            <a:pPr>
+              <a:buNone/>
+            </a:pPr>
+            <a:endParaRPr lang="es-MX" dirty="0" smtClean="0"/>
+          </a:p>
+          <a:p>
+            <a:pPr>
+              <a:buNone/>
+            </a:pPr>
+            <a:endParaRPr lang="es-MX" dirty="0" smtClean="0"/>
           </a:p>
         </p:txBody>
       </p:sp>
@@ -4120,6 +4152,13 @@
   <p:clrMapOvr>
     <a:masterClrMapping/>
   </p:clrMapOvr>
+  <p:timing>
+    <p:tnLst>
+      <p:par>
+        <p:cTn id="1" dur="indefinite" restart="never" nodeType="tmRoot"/>
+      </p:par>
+    </p:tnLst>
+  </p:timing>
 </p:sld>
 </file>
 
@@ -4157,7 +4196,7 @@
           <a:p>
             <a:r>
               <a:rPr lang="es-MX" dirty="0" smtClean="0"/>
-              <a:t>DIAGRAMA DE ESTADOS</a:t>
+              <a:t>MODELO DE ESTADOS</a:t>
             </a:r>
             <a:endParaRPr lang="es-AR" dirty="0"/>
           </a:p>
@@ -4178,7 +4217,53 @@
           <a:bodyPr/>
           <a:lstStyle/>
           <a:p>
-            <a:endParaRPr lang="es-AR"/>
+            <a:r>
+              <a:rPr lang="es-AR" dirty="0" smtClean="0"/>
+              <a:t>Diagrama de estados. </a:t>
+            </a:r>
+            <a:r>
+              <a:rPr lang="en-US" dirty="0" smtClean="0"/>
+              <a:t>¿</a:t>
+            </a:r>
+            <a:r>
+              <a:rPr lang="es-AR" dirty="0" smtClean="0"/>
+              <a:t>Que nos reflejan? Transiciones y eventos. </a:t>
+            </a:r>
+          </a:p>
+          <a:p>
+            <a:r>
+              <a:rPr lang="es-AR" dirty="0" smtClean="0"/>
+              <a:t>Problemas que se nos presentaron:</a:t>
+            </a:r>
+          </a:p>
+          <a:p>
+            <a:pPr lvl="1"/>
+            <a:r>
+              <a:rPr lang="en-US" dirty="0" smtClean="0"/>
+              <a:t>¿</a:t>
+            </a:r>
+            <a:r>
+              <a:rPr lang="es-AR" dirty="0" smtClean="0"/>
+              <a:t>Para que objetos?</a:t>
+            </a:r>
+          </a:p>
+          <a:p>
+            <a:pPr lvl="1"/>
+            <a:r>
+              <a:rPr lang="es-AR" dirty="0" smtClean="0"/>
+              <a:t>Detección de estados y </a:t>
+            </a:r>
+            <a:r>
+              <a:rPr lang="es-AR" dirty="0" err="1" smtClean="0"/>
+              <a:t>superestados</a:t>
+            </a:r>
+            <a:endParaRPr lang="es-AR" dirty="0" smtClean="0"/>
+          </a:p>
+          <a:p>
+            <a:pPr>
+              <a:buNone/>
+            </a:pPr>
+            <a:endParaRPr lang="es-AR" dirty="0"/>
           </a:p>
         </p:txBody>
       </p:sp>
@@ -4187,6 +4272,13 @@
   <p:clrMapOvr>
     <a:masterClrMapping/>
   </p:clrMapOvr>
+  <p:timing>
+    <p:tnLst>
+      <p:par>
+        <p:cTn id="1" dur="indefinite" restart="never" nodeType="tmRoot"/>
+      </p:par>
+    </p:tnLst>
+  </p:timing>
 </p:sld>
 </file>
 
@@ -4292,6 +4384,13 @@
   <p:clrMapOvr>
     <a:masterClrMapping/>
   </p:clrMapOvr>
+  <p:timing>
+    <p:tnLst>
+      <p:par>
+        <p:cTn id="1" dur="indefinite" restart="never" nodeType="tmRoot"/>
+      </p:par>
+    </p:tnLst>
+  </p:timing>
 </p:sld>
 </file>
 
@@ -4406,6 +4505,13 @@
   <p:clrMapOvr>
     <a:masterClrMapping/>
   </p:clrMapOvr>
+  <p:timing>
+    <p:tnLst>
+      <p:par>
+        <p:cTn id="1" dur="indefinite" restart="never" nodeType="tmRoot"/>
+      </p:par>
+    </p:tnLst>
+  </p:timing>
 </p:sld>
 </file>
 
@@ -4467,7 +4573,7 @@
         </p:spPr>
         <p:txBody>
           <a:bodyPr>
-            <a:normAutofit/>
+            <a:normAutofit fontScale="92500"/>
           </a:bodyPr>
           <a:lstStyle/>
           <a:p>
@@ -4480,6 +4586,12 @@
             <a:r>
               <a:rPr lang="es-MX" dirty="0" smtClean="0"/>
               <a:t>Contemplación de todos los objetivos</a:t>
+            </a:r>
+          </a:p>
+          <a:p>
+            <a:r>
+              <a:rPr lang="es-MX" dirty="0" smtClean="0"/>
+              <a:t>Definición de datos que guarda el sistema.</a:t>
             </a:r>
           </a:p>
           <a:p>
@@ -4495,6 +4607,13 @@
   <p:clrMapOvr>
     <a:masterClrMapping/>
   </p:clrMapOvr>
+  <p:timing>
+    <p:tnLst>
+      <p:par>
+        <p:cTn id="1" dur="indefinite" restart="never" nodeType="tmRoot"/>
+      </p:par>
+    </p:tnLst>
+  </p:timing>
 </p:sld>
 </file>
 
@@ -4564,15 +4683,7 @@
           <a:p>
             <a:r>
               <a:rPr lang="es-MX" dirty="0" smtClean="0"/>
-              <a:t>En relación </a:t>
-            </a:r>
-            <a:r>
-              <a:rPr lang="es-MX" dirty="0" smtClean="0"/>
-              <a:t>al dominio del </a:t>
-            </a:r>
-            <a:r>
-              <a:rPr lang="es-MX" dirty="0" smtClean="0"/>
-              <a:t>problema</a:t>
+              <a:t>En relación al dominio del problema</a:t>
             </a:r>
           </a:p>
           <a:p>
@@ -4580,7 +4691,6 @@
               <a:rPr lang="es-MX" dirty="0" smtClean="0"/>
               <a:t>Verosimilitud</a:t>
             </a:r>
-            <a:endParaRPr lang="es-MX" dirty="0" smtClean="0"/>
           </a:p>
           <a:p>
             <a:r>
@@ -4601,6 +4711,13 @@
   <p:clrMapOvr>
     <a:masterClrMapping/>
   </p:clrMapOvr>
+  <p:timing>
+    <p:tnLst>
+      <p:par>
+        <p:cTn id="1" dur="indefinite" restart="never" nodeType="tmRoot"/>
+      </p:par>
+    </p:tnLst>
+  </p:timing>
 </p:sld>
 </file>
 
@@ -4640,11 +4757,15 @@
           <a:p>
             <a:r>
               <a:rPr lang="es-MX" dirty="0" smtClean="0"/>
-              <a:t>HIPÓTESIS </a:t>
-            </a:r>
-            <a:r>
-              <a:rPr lang="es-MX" dirty="0" smtClean="0"/>
-              <a:t>PRINCIPALES (I)</a:t>
+              <a:t>HIPOTESIS</a:t>
+            </a:r>
+            <a:r>
+              <a:rPr lang="es-MX" dirty="0" smtClean="0"/>
+              <a:t> </a:t>
+            </a:r>
+            <a:r>
+              <a:rPr lang="es-MX" dirty="0" smtClean="0"/>
+              <a:t>PRINCIPALES</a:t>
             </a:r>
             <a:endParaRPr lang="es-AR" dirty="0"/>
           </a:p>
@@ -4662,25 +4783,29 @@
         </p:nvSpPr>
         <p:spPr>
           <a:xfrm>
-            <a:off x="502920" y="1959380"/>
-            <a:ext cx="8183880" cy="2939240"/>
+            <a:off x="502920" y="1357298"/>
+            <a:ext cx="8183880" cy="3541322"/>
           </a:xfrm>
         </p:spPr>
         <p:txBody>
-          <a:bodyPr/>
+          <a:bodyPr>
+            <a:normAutofit fontScale="92500" lnSpcReduction="10000"/>
+          </a:bodyPr>
           <a:lstStyle/>
           <a:p>
             <a:r>
               <a:rPr lang="es-MX" dirty="0" smtClean="0"/>
-              <a:t>Uso de </a:t>
-            </a:r>
-            <a:r>
-              <a:rPr lang="es-MX" dirty="0" smtClean="0"/>
-              <a:t>moneda </a:t>
-            </a:r>
-            <a:r>
-              <a:rPr lang="es-MX" dirty="0" smtClean="0"/>
-              <a:t>única</a:t>
+              <a:t>Existencia </a:t>
+            </a:r>
+            <a:r>
+              <a:rPr lang="es-MX" dirty="0" smtClean="0"/>
+              <a:t>de clientes prioritarios ante sobreventas</a:t>
+            </a:r>
+          </a:p>
+          <a:p>
+            <a:r>
+              <a:rPr lang="es-MX" dirty="0" smtClean="0"/>
+              <a:t>Acuerdo junto al cliente de un seguro en función al valor de la carga y al servicio contratado. </a:t>
             </a:r>
           </a:p>
           <a:p>
@@ -4696,12 +4821,19 @@
           <a:p>
             <a:r>
               <a:rPr lang="es-MX" dirty="0" smtClean="0"/>
-              <a:t>Existencia de clientes prioritarios ante </a:t>
-            </a:r>
-            <a:r>
-              <a:rPr lang="es-MX" dirty="0" smtClean="0"/>
-              <a:t>sobreventas</a:t>
-            </a:r>
+              <a:t>Indemnizaciones </a:t>
+            </a:r>
+            <a:r>
+              <a:rPr lang="es-MX" dirty="0" smtClean="0"/>
+              <a:t>por cuenta de empresas </a:t>
+            </a:r>
+            <a:r>
+              <a:rPr lang="es-MX" dirty="0" err="1" smtClean="0"/>
+              <a:t>tercerizadas</a:t>
+            </a:r>
+            <a:endParaRPr lang="es-MX" dirty="0" smtClean="0"/>
+          </a:p>
+          <a:p>
             <a:endParaRPr lang="es-MX" dirty="0" smtClean="0"/>
           </a:p>
         </p:txBody>
@@ -4711,6 +4843,13 @@
   <p:clrMapOvr>
     <a:masterClrMapping/>
   </p:clrMapOvr>
+  <p:timing>
+    <p:tnLst>
+      <p:par>
+        <p:cTn id="1" dur="indefinite" restart="never" nodeType="tmRoot"/>
+      </p:par>
+    </p:tnLst>
+  </p:timing>
 </p:sld>
 </file>
 
@@ -4743,63 +4882,93 @@
         </p:nvSpPr>
         <p:spPr/>
         <p:txBody>
+          <a:bodyPr/>
+          <a:lstStyle/>
+          <a:p>
+            <a:r>
+              <a:rPr lang="en-US" dirty="0" smtClean="0"/>
+              <a:t>ITINERARIO</a:t>
+            </a:r>
+            <a:endParaRPr lang="en-US" dirty="0"/>
+          </a:p>
+        </p:txBody>
+      </p:sp>
+      <p:sp>
+        <p:nvSpPr>
+          <p:cNvPr id="3" name="2 Marcador de contenido"/>
+          <p:cNvSpPr>
+            <a:spLocks noGrp="1"/>
+          </p:cNvSpPr>
+          <p:nvPr>
+            <p:ph idx="1"/>
+          </p:nvPr>
+        </p:nvSpPr>
+        <p:spPr/>
+        <p:txBody>
           <a:bodyPr>
-            <a:normAutofit/>
+            <a:normAutofit fontScale="92500" lnSpcReduction="10000"/>
           </a:bodyPr>
           <a:lstStyle/>
           <a:p>
-            <a:r>
-              <a:rPr lang="es-MX" dirty="0" smtClean="0"/>
-              <a:t>HIPÓTESIS </a:t>
-            </a:r>
-            <a:r>
-              <a:rPr lang="es-MX" dirty="0" smtClean="0"/>
-              <a:t>PRINCIPALES (II)</a:t>
-            </a:r>
-            <a:endParaRPr lang="es-AR" dirty="0"/>
-          </a:p>
-        </p:txBody>
-      </p:sp>
-      <p:sp>
-        <p:nvSpPr>
-          <p:cNvPr id="3" name="2 Marcador de contenido"/>
-          <p:cNvSpPr>
-            <a:spLocks noGrp="1"/>
-          </p:cNvSpPr>
-          <p:nvPr>
-            <p:ph idx="1"/>
-          </p:nvPr>
-        </p:nvSpPr>
-        <p:spPr>
-          <a:xfrm>
-            <a:off x="502920" y="2209413"/>
-            <a:ext cx="8183880" cy="2439174"/>
-          </a:xfrm>
-        </p:spPr>
-        <p:txBody>
-          <a:bodyPr/>
-          <a:lstStyle/>
-          <a:p>
-            <a:r>
-              <a:rPr lang="es-MX" dirty="0" smtClean="0"/>
-              <a:t>Indemnizaciones </a:t>
-            </a:r>
-            <a:r>
-              <a:rPr lang="es-MX" dirty="0" smtClean="0"/>
-              <a:t>por cuenta de empresas </a:t>
-            </a:r>
-            <a:r>
-              <a:rPr lang="es-MX" dirty="0" err="1" smtClean="0"/>
-              <a:t>tercerizadas</a:t>
-            </a:r>
+            <a:pPr>
+              <a:buNone/>
+            </a:pPr>
             <a:endParaRPr lang="es-MX" dirty="0" smtClean="0"/>
           </a:p>
           <a:p>
             <a:r>
               <a:rPr lang="es-MX" dirty="0" smtClean="0"/>
-              <a:t>Itinerarios variables para igual origen y destino</a:t>
+              <a:t>Itinerarios </a:t>
+            </a:r>
+            <a:r>
+              <a:rPr lang="es-MX" dirty="0" smtClean="0"/>
+              <a:t>variables para igual origen y </a:t>
+            </a:r>
+            <a:r>
+              <a:rPr lang="es-MX" dirty="0" smtClean="0"/>
+              <a:t>destino</a:t>
+            </a:r>
+          </a:p>
+          <a:p>
+            <a:r>
+              <a:rPr lang="es-AR" dirty="0" smtClean="0"/>
+              <a:t>Itinerarios conformado por tramos</a:t>
+            </a:r>
+            <a:r>
+              <a:rPr lang="es-AR" dirty="0" smtClean="0"/>
+              <a:t>.</a:t>
+            </a:r>
+            <a:endParaRPr lang="es-MX" dirty="0" smtClean="0"/>
+          </a:p>
+          <a:p>
+            <a:r>
+              <a:rPr lang="es-MX" dirty="0" smtClean="0"/>
+              <a:t>Contratación de empresas de transporte para el envió de las cargas en cada </a:t>
+            </a:r>
+            <a:r>
+              <a:rPr lang="es-MX" dirty="0" smtClean="0"/>
+              <a:t>tramo</a:t>
+            </a:r>
+          </a:p>
+          <a:p>
+            <a:r>
+              <a:rPr lang="es-AR" dirty="0" smtClean="0"/>
+              <a:t>Margen de tiempo en la planificación de cada tramo</a:t>
+            </a:r>
+          </a:p>
+          <a:p>
+            <a:r>
+              <a:rPr lang="es-AR" smtClean="0"/>
+              <a:t>[Acá </a:t>
+            </a:r>
+            <a:r>
+              <a:rPr lang="es-AR" dirty="0" smtClean="0"/>
+              <a:t>capaz puede ir una imagen mostrando un itinerario con dos tramos]</a:t>
             </a:r>
             <a:endParaRPr lang="es-AR" dirty="0" smtClean="0"/>
+          </a:p>
+          <a:p>
+            <a:endParaRPr lang="en-US" dirty="0"/>
           </a:p>
         </p:txBody>
       </p:sp>
@@ -4844,10 +5013,10 @@
           <a:lstStyle/>
           <a:p>
             <a:r>
-              <a:rPr lang="es-MX" dirty="0" smtClean="0"/>
-              <a:t>ACTORES Y CASOS DE USO</a:t>
-            </a:r>
-            <a:endParaRPr lang="es-AR" dirty="0"/>
+              <a:rPr lang="en-US" dirty="0" smtClean="0"/>
+              <a:t>MODELO DE NEGOCIO</a:t>
+            </a:r>
+            <a:endParaRPr lang="en-US" dirty="0"/>
           </a:p>
         </p:txBody>
       </p:sp>
@@ -4861,30 +5030,44 @@
             <p:ph idx="1"/>
           </p:nvPr>
         </p:nvSpPr>
-        <p:spPr>
-          <a:xfrm>
-            <a:off x="502920" y="2694190"/>
-            <a:ext cx="8183880" cy="1469620"/>
-          </a:xfrm>
-        </p:spPr>
+        <p:spPr/>
         <p:txBody>
           <a:bodyPr/>
           <a:lstStyle/>
           <a:p>
             <a:r>
-              <a:rPr lang="es-MX" dirty="0" smtClean="0"/>
-              <a:t>Actores de Análisis</a:t>
-            </a:r>
-          </a:p>
-          <a:p>
-            <a:pPr lvl="1"/>
-            <a:r>
-              <a:rPr lang="es-MX" dirty="0" smtClean="0"/>
-              <a:t>No operadores ni intermediarios</a:t>
-            </a:r>
-          </a:p>
-          <a:p>
-            <a:endParaRPr lang="es-MX" dirty="0" smtClean="0"/>
+              <a:rPr lang="es-AR" dirty="0" smtClean="0"/>
+              <a:t>Actividades</a:t>
+            </a:r>
+            <a:r>
+              <a:rPr lang="en-US" dirty="0" smtClean="0"/>
+              <a:t> </a:t>
+            </a:r>
+            <a:r>
+              <a:rPr lang="es-AR" dirty="0" smtClean="0"/>
+              <a:t>vs Hitos.</a:t>
+            </a:r>
+          </a:p>
+          <a:p>
+            <a:r>
+              <a:rPr lang="es-AR" dirty="0" smtClean="0"/>
+              <a:t>Separar los detalles del modelo de negocio.</a:t>
+            </a:r>
+          </a:p>
+          <a:p>
+            <a:r>
+              <a:rPr lang="es-AR" dirty="0" smtClean="0"/>
+              <a:t>Bifurcaciones dentro de una actividad. </a:t>
+            </a:r>
+          </a:p>
+          <a:p>
+            <a:r>
+              <a:rPr lang="es-AR" dirty="0" smtClean="0"/>
+              <a:t>Problemas para la representación de ciclos.</a:t>
+            </a:r>
+          </a:p>
+          <a:p>
+            <a:endParaRPr lang="en-US" dirty="0" smtClean="0"/>
           </a:p>
         </p:txBody>
       </p:sp>
@@ -4893,6 +5076,13 @@
   <p:clrMapOvr>
     <a:masterClrMapping/>
   </p:clrMapOvr>
+  <p:timing>
+    <p:tnLst>
+      <p:par>
+        <p:cTn id="1" dur="indefinite" restart="never" nodeType="tmRoot"/>
+      </p:par>
+    </p:tnLst>
+  </p:timing>
 </p:sld>
 </file>
 
@@ -4932,7 +5122,11 @@
           <a:p>
             <a:r>
               <a:rPr lang="es-MX" dirty="0" smtClean="0"/>
-              <a:t>CASOS DE USO</a:t>
+              <a:t>MODELO DE CASOS </a:t>
+            </a:r>
+            <a:r>
+              <a:rPr lang="es-MX" dirty="0" smtClean="0"/>
+              <a:t>DE USO</a:t>
             </a:r>
             <a:endParaRPr lang="es-AR" dirty="0"/>
           </a:p>
@@ -4950,23 +5144,89 @@
         </p:nvSpPr>
         <p:spPr>
           <a:xfrm>
-            <a:off x="502920" y="2051114"/>
-            <a:ext cx="8183880" cy="2755772"/>
+            <a:off x="502920" y="500042"/>
+            <a:ext cx="8183880" cy="4929222"/>
           </a:xfrm>
         </p:spPr>
         <p:txBody>
-          <a:bodyPr/>
+          <a:bodyPr>
+            <a:normAutofit fontScale="92500" lnSpcReduction="10000"/>
+          </a:bodyPr>
           <a:lstStyle/>
           <a:p>
-            <a:r>
-              <a:rPr lang="es-MX" dirty="0" smtClean="0"/>
-              <a:t>Casos completos pero específicos</a:t>
-            </a:r>
+            <a:pPr>
+              <a:buNone/>
+            </a:pPr>
+            <a:r>
+              <a:rPr lang="es-MX" sz="3000" b="1" dirty="0" smtClean="0">
+                <a:solidFill>
+                  <a:schemeClr val="accent6"/>
+                </a:solidFill>
+              </a:rPr>
+              <a:t>Actores</a:t>
+            </a:r>
+            <a:r>
+              <a:rPr lang="es-MX" sz="3000" dirty="0" smtClean="0"/>
+              <a:t> </a:t>
+            </a:r>
+          </a:p>
+          <a:p>
+            <a:r>
+              <a:rPr lang="es-MX" dirty="0" smtClean="0"/>
+              <a:t>Identificación.</a:t>
+            </a:r>
+            <a:endParaRPr lang="es-MX" dirty="0" smtClean="0"/>
           </a:p>
           <a:p>
             <a:pPr lvl="1"/>
             <a:r>
               <a:rPr lang="es-MX" dirty="0" smtClean="0"/>
+              <a:t>Ni </a:t>
+            </a:r>
+            <a:r>
+              <a:rPr lang="es-MX" dirty="0" smtClean="0"/>
+              <a:t>operadores ni intermediarios</a:t>
+            </a:r>
+          </a:p>
+          <a:p>
+            <a:endParaRPr lang="es-MX" dirty="0" smtClean="0"/>
+          </a:p>
+          <a:p>
+            <a:r>
+              <a:rPr lang="es-MX" dirty="0" smtClean="0"/>
+              <a:t>Generalización de actores</a:t>
+            </a:r>
+          </a:p>
+          <a:p>
+            <a:endParaRPr lang="es-MX" dirty="0" smtClean="0"/>
+          </a:p>
+          <a:p>
+            <a:pPr>
+              <a:buNone/>
+            </a:pPr>
+            <a:r>
+              <a:rPr lang="es-MX" sz="3000" b="1" dirty="0" smtClean="0">
+                <a:solidFill>
+                  <a:schemeClr val="accent6"/>
+                </a:solidFill>
+              </a:rPr>
+              <a:t>Casos de Uso</a:t>
+            </a:r>
+          </a:p>
+          <a:p>
+            <a:r>
+              <a:rPr lang="es-MX" dirty="0" smtClean="0"/>
+              <a:t>Casos </a:t>
+            </a:r>
+            <a:r>
+              <a:rPr lang="es-MX" dirty="0" smtClean="0"/>
+              <a:t>completos pero específicos</a:t>
+            </a:r>
+          </a:p>
+          <a:p>
+            <a:pPr lvl="1"/>
+            <a:r>
+              <a:rPr lang="es-MX" dirty="0" smtClean="0"/>
               <a:t>No exagerar el principio de completitud</a:t>
             </a:r>
           </a:p>
@@ -4987,11 +5247,7 @@
             <a:pPr lvl="1"/>
             <a:r>
               <a:rPr lang="es-MX" dirty="0" smtClean="0"/>
-              <a:t>Requerir correctamente ejecución de </a:t>
-            </a:r>
-            <a:r>
-              <a:rPr lang="es-MX" dirty="0" err="1" smtClean="0"/>
-              <a:t>subflujos</a:t>
+              <a:t>Requerir correctamente ejecución de subflujos</a:t>
             </a:r>
             <a:endParaRPr lang="es-AR" dirty="0" smtClean="0"/>
           </a:p>
@@ -5005,6 +5261,13 @@
   <p:clrMapOvr>
     <a:masterClrMapping/>
   </p:clrMapOvr>
+  <p:timing>
+    <p:tnLst>
+      <p:par>
+        <p:cTn id="1" dur="indefinite" restart="never" nodeType="tmRoot"/>
+      </p:par>
+    </p:tnLst>
+  </p:timing>
 </p:sld>
 </file>
 
@@ -5042,7 +5305,7 @@
           <a:p>
             <a:r>
               <a:rPr lang="es-MX" dirty="0" smtClean="0"/>
-              <a:t>DIAGRAMAS DE SECUENCIA</a:t>
+              <a:t>MODELO DE OBJETOS</a:t>
             </a:r>
             <a:endParaRPr lang="es-AR" dirty="0"/>
           </a:p>
@@ -5065,14 +5328,48 @@
           <a:p>
             <a:r>
               <a:rPr lang="es-MX" dirty="0" smtClean="0"/>
-              <a:t>Nombres de mensajes descriptivos</a:t>
-            </a:r>
-          </a:p>
-          <a:p>
-            <a:r>
-              <a:rPr lang="es-MX" dirty="0" smtClean="0"/>
-              <a:t>Uso de bucles y condicionales</a:t>
-            </a:r>
+              <a:t>Sólo clases de entidad.</a:t>
+            </a:r>
+          </a:p>
+          <a:p>
+            <a:pPr lvl="1"/>
+            <a:r>
+              <a:rPr lang="es-MX" dirty="0" smtClean="0"/>
+              <a:t>No de control.</a:t>
+            </a:r>
+          </a:p>
+          <a:p>
+            <a:r>
+              <a:rPr lang="es-MX" dirty="0" smtClean="0"/>
+              <a:t>Incluir atributos en diagrama preliminar de clases.</a:t>
+            </a:r>
+          </a:p>
+          <a:p>
+            <a:r>
+              <a:rPr lang="es-MX" dirty="0" smtClean="0"/>
+              <a:t>Sólo operaciones relacionadas con el dominio del problema. </a:t>
+            </a:r>
+          </a:p>
+          <a:p>
+            <a:pPr lvl="1"/>
+            <a:r>
+              <a:rPr lang="es-MX" dirty="0" smtClean="0"/>
+              <a:t>No referentes a la solución del mismo.</a:t>
+            </a:r>
+          </a:p>
+          <a:p>
+            <a:pPr>
+              <a:buNone/>
+            </a:pPr>
+            <a:endParaRPr lang="es-MX" dirty="0" smtClean="0"/>
+          </a:p>
+          <a:p>
+            <a:pPr lvl="1"/>
+            <a:endParaRPr lang="es-MX" dirty="0" smtClean="0"/>
+          </a:p>
+          <a:p>
+            <a:pPr lvl="1"/>
+            <a:endParaRPr lang="es-MX" dirty="0" smtClean="0"/>
           </a:p>
         </p:txBody>
       </p:sp>
@@ -5081,6 +5378,13 @@
   <p:clrMapOvr>
     <a:masterClrMapping/>
   </p:clrMapOvr>
+  <p:timing>
+    <p:tnLst>
+      <p:par>
+        <p:cTn id="1" dur="indefinite" restart="never" nodeType="tmRoot"/>
+      </p:par>
+    </p:tnLst>
+  </p:timing>
 </p:sld>
 </file>
 

</xml_diff>

<commit_message>
subo presentación actualizada con modelo de objetos
</commit_message>
<xml_diff>
--- a/TODOMUNDO/presentacion.pptx
+++ b/TODOMUNDO/presentacion.pptx
@@ -425,7 +425,7 @@
             <a:fld id="{635D96E9-2F8C-4717-83E7-8CBC9BFC8E60}" type="datetimeFigureOut">
               <a:rPr lang="es-AR" smtClean="0"/>
               <a:pPr/>
-              <a:t>08/12/2009</a:t>
+              <a:t>10/12/2009</a:t>
             </a:fld>
             <a:endParaRPr lang="es-AR"/>
           </a:p>
@@ -612,7 +612,7 @@
             <a:fld id="{635D96E9-2F8C-4717-83E7-8CBC9BFC8E60}" type="datetimeFigureOut">
               <a:rPr lang="es-AR" smtClean="0"/>
               <a:pPr/>
-              <a:t>08/12/2009</a:t>
+              <a:t>10/12/2009</a:t>
             </a:fld>
             <a:endParaRPr lang="es-AR"/>
           </a:p>
@@ -799,7 +799,7 @@
             <a:fld id="{635D96E9-2F8C-4717-83E7-8CBC9BFC8E60}" type="datetimeFigureOut">
               <a:rPr lang="es-AR" smtClean="0"/>
               <a:pPr/>
-              <a:t>08/12/2009</a:t>
+              <a:t>10/12/2009</a:t>
             </a:fld>
             <a:endParaRPr lang="es-AR"/>
           </a:p>
@@ -986,7 +986,7 @@
             <a:fld id="{635D96E9-2F8C-4717-83E7-8CBC9BFC8E60}" type="datetimeFigureOut">
               <a:rPr lang="es-AR" smtClean="0"/>
               <a:pPr/>
-              <a:t>08/12/2009</a:t>
+              <a:t>10/12/2009</a:t>
             </a:fld>
             <a:endParaRPr lang="es-AR"/>
           </a:p>
@@ -1369,7 +1369,7 @@
             <a:fld id="{635D96E9-2F8C-4717-83E7-8CBC9BFC8E60}" type="datetimeFigureOut">
               <a:rPr lang="es-AR" smtClean="0"/>
               <a:pPr/>
-              <a:t>08/12/2009</a:t>
+              <a:t>10/12/2009</a:t>
             </a:fld>
             <a:endParaRPr lang="es-AR"/>
           </a:p>
@@ -1640,7 +1640,7 @@
             <a:fld id="{635D96E9-2F8C-4717-83E7-8CBC9BFC8E60}" type="datetimeFigureOut">
               <a:rPr lang="es-AR" smtClean="0"/>
               <a:pPr/>
-              <a:t>08/12/2009</a:t>
+              <a:t>10/12/2009</a:t>
             </a:fld>
             <a:endParaRPr lang="es-AR"/>
           </a:p>
@@ -2027,7 +2027,7 @@
             <a:fld id="{635D96E9-2F8C-4717-83E7-8CBC9BFC8E60}" type="datetimeFigureOut">
               <a:rPr lang="es-AR" smtClean="0"/>
               <a:pPr/>
-              <a:t>08/12/2009</a:t>
+              <a:t>10/12/2009</a:t>
             </a:fld>
             <a:endParaRPr lang="es-AR"/>
           </a:p>
@@ -2150,7 +2150,7 @@
             <a:fld id="{635D96E9-2F8C-4717-83E7-8CBC9BFC8E60}" type="datetimeFigureOut">
               <a:rPr lang="es-AR" smtClean="0"/>
               <a:pPr/>
-              <a:t>08/12/2009</a:t>
+              <a:t>10/12/2009</a:t>
             </a:fld>
             <a:endParaRPr lang="es-AR"/>
           </a:p>
@@ -2332,7 +2332,7 @@
             <a:fld id="{635D96E9-2F8C-4717-83E7-8CBC9BFC8E60}" type="datetimeFigureOut">
               <a:rPr lang="es-AR" smtClean="0"/>
               <a:pPr/>
-              <a:t>08/12/2009</a:t>
+              <a:t>10/12/2009</a:t>
             </a:fld>
             <a:endParaRPr lang="es-AR"/>
           </a:p>
@@ -2668,7 +2668,7 @@
             <a:fld id="{635D96E9-2F8C-4717-83E7-8CBC9BFC8E60}" type="datetimeFigureOut">
               <a:rPr lang="es-AR" smtClean="0"/>
               <a:pPr/>
-              <a:t>08/12/2009</a:t>
+              <a:t>10/12/2009</a:t>
             </a:fld>
             <a:endParaRPr lang="es-AR"/>
           </a:p>
@@ -3039,7 +3039,7 @@
             <a:fld id="{635D96E9-2F8C-4717-83E7-8CBC9BFC8E60}" type="datetimeFigureOut">
               <a:rPr lang="es-AR" smtClean="0"/>
               <a:pPr/>
-              <a:t>08/12/2009</a:t>
+              <a:t>10/12/2009</a:t>
             </a:fld>
             <a:endParaRPr lang="es-AR"/>
           </a:p>
@@ -3459,7 +3459,7 @@
             <a:fld id="{635D96E9-2F8C-4717-83E7-8CBC9BFC8E60}" type="datetimeFigureOut">
               <a:rPr lang="es-AR" smtClean="0"/>
               <a:pPr/>
-              <a:t>08/12/2009</a:t>
+              <a:t>10/12/2009</a:t>
             </a:fld>
             <a:endParaRPr lang="es-AR"/>
           </a:p>
@@ -4108,11 +4108,7 @@
           <a:p>
             <a:r>
               <a:rPr lang="es-MX" dirty="0" smtClean="0"/>
-              <a:t>Indicar </a:t>
-            </a:r>
-            <a:r>
-              <a:rPr lang="es-MX" dirty="0" smtClean="0"/>
-              <a:t>escenarios concretos</a:t>
+              <a:t>Indicar escenarios concretos</a:t>
             </a:r>
           </a:p>
           <a:p>
@@ -4757,15 +4753,7 @@
           <a:p>
             <a:r>
               <a:rPr lang="es-MX" dirty="0" smtClean="0"/>
-              <a:t>HIPOTESIS</a:t>
-            </a:r>
-            <a:r>
-              <a:rPr lang="es-MX" dirty="0" smtClean="0"/>
-              <a:t> </a:t>
-            </a:r>
-            <a:r>
-              <a:rPr lang="es-MX" dirty="0" smtClean="0"/>
-              <a:t>PRINCIPALES</a:t>
+              <a:t>HIPOTESIS PRINCIPALES</a:t>
             </a:r>
             <a:endParaRPr lang="es-AR" dirty="0"/>
           </a:p>
@@ -4795,11 +4783,7 @@
           <a:p>
             <a:r>
               <a:rPr lang="es-MX" dirty="0" smtClean="0"/>
-              <a:t>Existencia </a:t>
-            </a:r>
-            <a:r>
-              <a:rPr lang="es-MX" dirty="0" smtClean="0"/>
-              <a:t>de clientes prioritarios ante sobreventas</a:t>
+              <a:t>Existencia de clientes prioritarios ante sobreventas</a:t>
             </a:r>
           </a:p>
           <a:p>
@@ -4811,21 +4795,13 @@
           <a:p>
             <a:r>
               <a:rPr lang="es-MX" dirty="0" smtClean="0"/>
-              <a:t>Reglamentaciones </a:t>
-            </a:r>
+              <a:t>Reglamentaciones y trámites aduaneros a cargo de terceros</a:t>
+            </a:r>
+          </a:p>
+          <a:p>
             <a:r>
               <a:rPr lang="es-MX" dirty="0" smtClean="0"/>
-              <a:t>y trámites aduaneros a cargo de terceros</a:t>
-            </a:r>
-          </a:p>
-          <a:p>
-            <a:r>
-              <a:rPr lang="es-MX" dirty="0" smtClean="0"/>
-              <a:t>Indemnizaciones </a:t>
-            </a:r>
-            <a:r>
-              <a:rPr lang="es-MX" dirty="0" smtClean="0"/>
-              <a:t>por cuenta de empresas </a:t>
+              <a:t>Indemnizaciones por cuenta de empresas </a:t>
             </a:r>
             <a:r>
               <a:rPr lang="es-MX" dirty="0" err="1" smtClean="0"/>
@@ -4918,36 +4894,20 @@
           <a:p>
             <a:r>
               <a:rPr lang="es-MX" dirty="0" smtClean="0"/>
-              <a:t>Itinerarios </a:t>
-            </a:r>
+              <a:t>Itinerarios variables para igual origen y destino</a:t>
+            </a:r>
+          </a:p>
+          <a:p>
+            <a:r>
+              <a:rPr lang="es-AR" dirty="0" smtClean="0"/>
+              <a:t>Itinerarios conformado por tramos.</a:t>
+            </a:r>
+            <a:endParaRPr lang="es-MX" dirty="0" smtClean="0"/>
+          </a:p>
+          <a:p>
             <a:r>
               <a:rPr lang="es-MX" dirty="0" smtClean="0"/>
-              <a:t>variables para igual origen y </a:t>
-            </a:r>
-            <a:r>
-              <a:rPr lang="es-MX" dirty="0" smtClean="0"/>
-              <a:t>destino</a:t>
-            </a:r>
-          </a:p>
-          <a:p>
-            <a:r>
-              <a:rPr lang="es-AR" dirty="0" smtClean="0"/>
-              <a:t>Itinerarios conformado por tramos</a:t>
-            </a:r>
-            <a:r>
-              <a:rPr lang="es-AR" dirty="0" smtClean="0"/>
-              <a:t>.</a:t>
-            </a:r>
-            <a:endParaRPr lang="es-MX" dirty="0" smtClean="0"/>
-          </a:p>
-          <a:p>
-            <a:r>
-              <a:rPr lang="es-MX" dirty="0" smtClean="0"/>
-              <a:t>Contratación de empresas de transporte para el envió de las cargas en cada </a:t>
-            </a:r>
-            <a:r>
-              <a:rPr lang="es-MX" dirty="0" smtClean="0"/>
-              <a:t>tramo</a:t>
+              <a:t>Contratación de empresas de transporte para el envió de las cargas en cada tramo</a:t>
             </a:r>
           </a:p>
           <a:p>
@@ -4965,7 +4925,6 @@
               <a:rPr lang="es-AR" dirty="0" smtClean="0"/>
               <a:t>capaz puede ir una imagen mostrando un itinerario con dos tramos]</a:t>
             </a:r>
-            <a:endParaRPr lang="es-AR" dirty="0" smtClean="0"/>
           </a:p>
           <a:p>
             <a:endParaRPr lang="en-US" dirty="0"/>
@@ -5122,11 +5081,7 @@
           <a:p>
             <a:r>
               <a:rPr lang="es-MX" dirty="0" smtClean="0"/>
-              <a:t>MODELO DE CASOS </a:t>
-            </a:r>
-            <a:r>
-              <a:rPr lang="es-MX" dirty="0" smtClean="0"/>
-              <a:t>DE USO</a:t>
+              <a:t>MODELO DE CASOS DE USO</a:t>
             </a:r>
             <a:endParaRPr lang="es-AR" dirty="0"/>
           </a:p>
@@ -5175,17 +5130,12 @@
               <a:rPr lang="es-MX" dirty="0" smtClean="0"/>
               <a:t>Identificación.</a:t>
             </a:r>
-            <a:endParaRPr lang="es-MX" dirty="0" smtClean="0"/>
           </a:p>
           <a:p>
             <a:pPr lvl="1"/>
             <a:r>
               <a:rPr lang="es-MX" dirty="0" smtClean="0"/>
-              <a:t>Ni </a:t>
-            </a:r>
-            <a:r>
-              <a:rPr lang="es-MX" dirty="0" smtClean="0"/>
-              <a:t>operadores ni intermediarios</a:t>
+              <a:t>Ni operadores ni intermediarios</a:t>
             </a:r>
           </a:p>
           <a:p>
@@ -5216,11 +5166,7 @@
           <a:p>
             <a:r>
               <a:rPr lang="es-MX" dirty="0" smtClean="0"/>
-              <a:t>Casos </a:t>
-            </a:r>
-            <a:r>
-              <a:rPr lang="es-MX" dirty="0" smtClean="0"/>
-              <a:t>completos pero específicos</a:t>
+              <a:t>Casos completos pero específicos</a:t>
             </a:r>
           </a:p>
           <a:p>
@@ -5304,10 +5250,10 @@
           <a:lstStyle/>
           <a:p>
             <a:r>
-              <a:rPr lang="es-MX" dirty="0" smtClean="0"/>
+              <a:rPr lang="es-MX" u="sng" dirty="0" smtClean="0"/>
               <a:t>MODELO DE OBJETOS</a:t>
             </a:r>
-            <a:endParaRPr lang="es-AR" dirty="0"/>
+            <a:endParaRPr lang="es-AR" u="sng" dirty="0"/>
           </a:p>
         </p:txBody>
       </p:sp>
@@ -5321,55 +5267,1166 @@
             <p:ph idx="1"/>
           </p:nvPr>
         </p:nvSpPr>
-        <p:spPr/>
-        <p:txBody>
-          <a:bodyPr/>
+        <p:spPr>
+          <a:xfrm>
+            <a:off x="502920" y="530352"/>
+            <a:ext cx="8183880" cy="2755772"/>
+          </a:xfrm>
+        </p:spPr>
+        <p:txBody>
+          <a:bodyPr>
+            <a:normAutofit/>
+          </a:bodyPr>
           <a:lstStyle/>
           <a:p>
             <a:r>
-              <a:rPr lang="es-MX" dirty="0" smtClean="0"/>
+              <a:rPr lang="es-MX" sz="2600" dirty="0" smtClean="0"/>
               <a:t>Sólo clases de entidad.</a:t>
             </a:r>
           </a:p>
           <a:p>
             <a:pPr lvl="1"/>
             <a:r>
-              <a:rPr lang="es-MX" dirty="0" smtClean="0"/>
-              <a:t>No de control.</a:t>
-            </a:r>
-          </a:p>
-          <a:p>
-            <a:r>
-              <a:rPr lang="es-MX" dirty="0" smtClean="0"/>
-              <a:t>Incluir atributos en diagrama preliminar de clases.</a:t>
-            </a:r>
-          </a:p>
-          <a:p>
-            <a:r>
-              <a:rPr lang="es-MX" dirty="0" smtClean="0"/>
-              <a:t>Sólo operaciones relacionadas con el dominio del problema. </a:t>
+              <a:rPr lang="es-MX" sz="2200" dirty="0" smtClean="0"/>
+              <a:t>No </a:t>
+            </a:r>
+            <a:r>
+              <a:rPr lang="es-MX" sz="2200" dirty="0" smtClean="0"/>
+              <a:t>de control</a:t>
+            </a:r>
+            <a:r>
+              <a:rPr lang="es-MX" sz="2200" dirty="0" smtClean="0"/>
+              <a:t>.</a:t>
             </a:r>
           </a:p>
           <a:p>
             <a:pPr lvl="1"/>
             <a:r>
-              <a:rPr lang="es-MX" dirty="0" smtClean="0"/>
-              <a:t>No referentes a la solución del mismo.</a:t>
-            </a:r>
-          </a:p>
-          <a:p>
-            <a:pPr>
-              <a:buNone/>
-            </a:pPr>
-            <a:endParaRPr lang="es-MX" dirty="0" smtClean="0"/>
+              <a:rPr lang="es-MX" sz="2200" dirty="0" smtClean="0"/>
+              <a:t>Atributos y operaciones de dominio del negocio</a:t>
+            </a:r>
+            <a:endParaRPr lang="es-MX" sz="2200" dirty="0" smtClean="0"/>
+          </a:p>
+          <a:p>
+            <a:r>
+              <a:rPr lang="es-MX" sz="2600" dirty="0" smtClean="0"/>
+              <a:t>Enfocarse en qué datos maneja el sistema</a:t>
+            </a:r>
+          </a:p>
+          <a:p>
+            <a:r>
+              <a:rPr lang="es-MX" sz="2600" dirty="0" smtClean="0"/>
+              <a:t>Ojo con “Actor en caso de uso -&gt; Clase”</a:t>
+            </a:r>
           </a:p>
           <a:p>
             <a:pPr lvl="1"/>
-            <a:endParaRPr lang="es-MX" dirty="0" smtClean="0"/>
-          </a:p>
-          <a:p>
-            <a:pPr lvl="1"/>
-            <a:endParaRPr lang="es-MX" dirty="0" smtClean="0"/>
+            <a:r>
+              <a:rPr lang="es-MX" sz="2200" dirty="0" err="1" smtClean="0"/>
+              <a:t>Ej</a:t>
+            </a:r>
+            <a:r>
+              <a:rPr lang="es-MX" sz="2200" dirty="0" smtClean="0"/>
+              <a:t>: clase Cliente</a:t>
+            </a:r>
+            <a:endParaRPr lang="es-MX" sz="2200" dirty="0" smtClean="0"/>
+          </a:p>
+        </p:txBody>
+      </p:sp>
+      <p:grpSp>
+        <p:nvGrpSpPr>
+          <p:cNvPr id="129" name="128 Grupo"/>
+          <p:cNvGrpSpPr/>
+          <p:nvPr/>
+        </p:nvGrpSpPr>
+        <p:grpSpPr>
+          <a:xfrm>
+            <a:off x="571472" y="2928934"/>
+            <a:ext cx="4500594" cy="2379479"/>
+            <a:chOff x="571472" y="2928934"/>
+            <a:chExt cx="4500594" cy="2379479"/>
+          </a:xfrm>
+        </p:grpSpPr>
+        <p:cxnSp>
+          <p:nvCxnSpPr>
+            <p:cNvPr id="101" name="100 Conector angular"/>
+            <p:cNvCxnSpPr>
+              <a:stCxn id="98" idx="0"/>
+              <a:endCxn id="89" idx="2"/>
+            </p:cNvCxnSpPr>
+            <p:nvPr/>
+          </p:nvCxnSpPr>
+          <p:spPr>
+            <a:xfrm rot="16200000" flipV="1">
+              <a:off x="2970434" y="2899003"/>
+              <a:ext cx="524208" cy="2393173"/>
+            </a:xfrm>
+            <a:prstGeom prst="bentConnector3">
+              <a:avLst>
+                <a:gd name="adj1" fmla="val 50000"/>
+              </a:avLst>
+            </a:prstGeom>
+            <a:ln w="28575">
+              <a:headEnd type="none" w="med" len="med"/>
+              <a:tailEnd type="triangle" w="med" len="med"/>
+            </a:ln>
+          </p:spPr>
+          <p:style>
+            <a:lnRef idx="1">
+              <a:schemeClr val="accent1"/>
+            </a:lnRef>
+            <a:fillRef idx="0">
+              <a:schemeClr val="accent1"/>
+            </a:fillRef>
+            <a:effectRef idx="0">
+              <a:schemeClr val="accent1"/>
+            </a:effectRef>
+            <a:fontRef idx="minor">
+              <a:schemeClr val="tx1"/>
+            </a:fontRef>
+          </p:style>
+        </p:cxnSp>
+        <p:grpSp>
+          <p:nvGrpSpPr>
+            <p:cNvPr id="106" name="105 Grupo"/>
+            <p:cNvGrpSpPr>
+              <a:grpSpLocks/>
+            </p:cNvGrpSpPr>
+            <p:nvPr/>
+          </p:nvGrpSpPr>
+          <p:grpSpPr>
+            <a:xfrm>
+              <a:off x="571472" y="2928934"/>
+              <a:ext cx="4500594" cy="2379479"/>
+              <a:chOff x="714348" y="2928934"/>
+              <a:chExt cx="4500594" cy="2379479"/>
+            </a:xfrm>
+          </p:grpSpPr>
+          <p:grpSp>
+            <p:nvGrpSpPr>
+              <p:cNvPr id="104" name="103 Grupo"/>
+              <p:cNvGrpSpPr/>
+              <p:nvPr/>
+            </p:nvGrpSpPr>
+            <p:grpSpPr>
+              <a:xfrm>
+                <a:off x="714348" y="2928934"/>
+                <a:ext cx="4500594" cy="2047560"/>
+                <a:chOff x="642910" y="2928934"/>
+                <a:chExt cx="4500594" cy="2047560"/>
+              </a:xfrm>
+            </p:grpSpPr>
+            <p:sp>
+              <p:nvSpPr>
+                <p:cNvPr id="88" name="87 CuadroTexto"/>
+                <p:cNvSpPr txBox="1"/>
+                <p:nvPr/>
+              </p:nvSpPr>
+              <p:spPr>
+                <a:xfrm>
+                  <a:off x="1357290" y="3286124"/>
+                  <a:ext cx="1500198" cy="307777"/>
+                </a:xfrm>
+                <a:prstGeom prst="rect">
+                  <a:avLst/>
+                </a:prstGeom>
+              </p:spPr>
+              <p:style>
+                <a:lnRef idx="2">
+                  <a:schemeClr val="accent1"/>
+                </a:lnRef>
+                <a:fillRef idx="1">
+                  <a:schemeClr val="lt1"/>
+                </a:fillRef>
+                <a:effectRef idx="0">
+                  <a:schemeClr val="accent1"/>
+                </a:effectRef>
+                <a:fontRef idx="minor">
+                  <a:schemeClr val="dk1"/>
+                </a:fontRef>
+              </p:style>
+              <p:txBody>
+                <a:bodyPr wrap="square" rtlCol="0">
+                  <a:spAutoFit/>
+                </a:bodyPr>
+                <a:lstStyle/>
+                <a:p>
+                  <a:pPr algn="ctr"/>
+                  <a:r>
+                    <a:rPr lang="es-ES" sz="1400" dirty="0" smtClean="0"/>
+                    <a:t>Cliente</a:t>
+                  </a:r>
+                </a:p>
+              </p:txBody>
+            </p:sp>
+            <p:sp>
+              <p:nvSpPr>
+                <p:cNvPr id="89" name="88 CuadroTexto"/>
+                <p:cNvSpPr txBox="1"/>
+                <p:nvPr/>
+              </p:nvSpPr>
+              <p:spPr>
+                <a:xfrm>
+                  <a:off x="1357290" y="3571876"/>
+                  <a:ext cx="1500198" cy="261610"/>
+                </a:xfrm>
+                <a:prstGeom prst="rect">
+                  <a:avLst/>
+                </a:prstGeom>
+              </p:spPr>
+              <p:style>
+                <a:lnRef idx="2">
+                  <a:schemeClr val="accent1"/>
+                </a:lnRef>
+                <a:fillRef idx="1">
+                  <a:schemeClr val="lt1"/>
+                </a:fillRef>
+                <a:effectRef idx="0">
+                  <a:schemeClr val="accent1"/>
+                </a:effectRef>
+                <a:fontRef idx="minor">
+                  <a:schemeClr val="dk1"/>
+                </a:fontRef>
+              </p:style>
+              <p:txBody>
+                <a:bodyPr wrap="square" rtlCol="0">
+                  <a:spAutoFit/>
+                </a:bodyPr>
+                <a:lstStyle/>
+                <a:p>
+                  <a:r>
+                    <a:rPr lang="es-ES" sz="1050" dirty="0" smtClean="0"/>
+                    <a:t>-</a:t>
+                  </a:r>
+                  <a:r>
+                    <a:rPr lang="es-ES" sz="1050" dirty="0" err="1" smtClean="0"/>
+                    <a:t>datos_cliente</a:t>
+                  </a:r>
+                  <a:endParaRPr lang="es-ES" sz="1050" dirty="0"/>
+                </a:p>
+              </p:txBody>
+            </p:sp>
+            <p:sp>
+              <p:nvSpPr>
+                <p:cNvPr id="90" name="89 CuadroTexto"/>
+                <p:cNvSpPr txBox="1"/>
+                <p:nvPr/>
+              </p:nvSpPr>
+              <p:spPr>
+                <a:xfrm>
+                  <a:off x="642910" y="4357694"/>
+                  <a:ext cx="1428760" cy="307777"/>
+                </a:xfrm>
+                <a:prstGeom prst="rect">
+                  <a:avLst/>
+                </a:prstGeom>
+              </p:spPr>
+              <p:style>
+                <a:lnRef idx="2">
+                  <a:schemeClr val="accent1"/>
+                </a:lnRef>
+                <a:fillRef idx="1">
+                  <a:schemeClr val="lt1"/>
+                </a:fillRef>
+                <a:effectRef idx="0">
+                  <a:schemeClr val="accent1"/>
+                </a:effectRef>
+                <a:fontRef idx="minor">
+                  <a:schemeClr val="dk1"/>
+                </a:fontRef>
+              </p:style>
+              <p:txBody>
+                <a:bodyPr wrap="square" rtlCol="0">
+                  <a:spAutoFit/>
+                </a:bodyPr>
+                <a:lstStyle/>
+                <a:p>
+                  <a:pPr algn="ctr"/>
+                  <a:r>
+                    <a:rPr lang="es-ES" sz="1400" dirty="0" smtClean="0"/>
+                    <a:t>Pagador</a:t>
+                  </a:r>
+                </a:p>
+              </p:txBody>
+            </p:sp>
+            <p:sp>
+              <p:nvSpPr>
+                <p:cNvPr id="91" name="90 CuadroTexto"/>
+                <p:cNvSpPr txBox="1"/>
+                <p:nvPr/>
+              </p:nvSpPr>
+              <p:spPr>
+                <a:xfrm>
+                  <a:off x="642910" y="4643446"/>
+                  <a:ext cx="1428760" cy="107722"/>
+                </a:xfrm>
+                <a:prstGeom prst="rect">
+                  <a:avLst/>
+                </a:prstGeom>
+              </p:spPr>
+              <p:style>
+                <a:lnRef idx="2">
+                  <a:schemeClr val="accent1"/>
+                </a:lnRef>
+                <a:fillRef idx="1">
+                  <a:schemeClr val="lt1"/>
+                </a:fillRef>
+                <a:effectRef idx="0">
+                  <a:schemeClr val="accent1"/>
+                </a:effectRef>
+                <a:fontRef idx="minor">
+                  <a:schemeClr val="dk1"/>
+                </a:fontRef>
+              </p:style>
+              <p:txBody>
+                <a:bodyPr wrap="square" rtlCol="0">
+                  <a:spAutoFit/>
+                </a:bodyPr>
+                <a:lstStyle/>
+                <a:p>
+                  <a:endParaRPr lang="es-ES" sz="100" dirty="0"/>
+                </a:p>
+              </p:txBody>
+            </p:sp>
+            <p:sp>
+              <p:nvSpPr>
+                <p:cNvPr id="92" name="91 CuadroTexto"/>
+                <p:cNvSpPr txBox="1"/>
+                <p:nvPr/>
+              </p:nvSpPr>
+              <p:spPr>
+                <a:xfrm>
+                  <a:off x="642910" y="4714884"/>
+                  <a:ext cx="1428760" cy="253916"/>
+                </a:xfrm>
+                <a:prstGeom prst="rect">
+                  <a:avLst/>
+                </a:prstGeom>
+              </p:spPr>
+              <p:style>
+                <a:lnRef idx="2">
+                  <a:schemeClr val="accent1"/>
+                </a:lnRef>
+                <a:fillRef idx="1">
+                  <a:schemeClr val="lt1"/>
+                </a:fillRef>
+                <a:effectRef idx="0">
+                  <a:schemeClr val="accent1"/>
+                </a:effectRef>
+                <a:fontRef idx="minor">
+                  <a:schemeClr val="dk1"/>
+                </a:fontRef>
+              </p:style>
+              <p:txBody>
+                <a:bodyPr wrap="square" rtlCol="0">
+                  <a:spAutoFit/>
+                </a:bodyPr>
+                <a:lstStyle/>
+                <a:p>
+                  <a:r>
+                    <a:rPr lang="es-ES" sz="1050" dirty="0" smtClean="0"/>
+                    <a:t>+</a:t>
+                  </a:r>
+                  <a:r>
+                    <a:rPr lang="es-ES" sz="1050" dirty="0" err="1" smtClean="0"/>
+                    <a:t>pagar_servicio</a:t>
+                  </a:r>
+                  <a:r>
+                    <a:rPr lang="es-ES" sz="1050" dirty="0" smtClean="0"/>
+                    <a:t>()</a:t>
+                  </a:r>
+                  <a:endParaRPr lang="es-ES" sz="1050" dirty="0"/>
+                </a:p>
+              </p:txBody>
+            </p:sp>
+            <p:cxnSp>
+              <p:nvCxnSpPr>
+                <p:cNvPr id="93" name="92 Conector angular"/>
+                <p:cNvCxnSpPr>
+                  <a:stCxn id="90" idx="0"/>
+                  <a:endCxn id="89" idx="2"/>
+                </p:cNvCxnSpPr>
+                <p:nvPr/>
+              </p:nvCxnSpPr>
+              <p:spPr>
+                <a:xfrm rot="5400000" flipH="1" flipV="1">
+                  <a:off x="1470235" y="3720541"/>
+                  <a:ext cx="524208" cy="750099"/>
+                </a:xfrm>
+                <a:prstGeom prst="bentConnector3">
+                  <a:avLst>
+                    <a:gd name="adj1" fmla="val 50000"/>
+                  </a:avLst>
+                </a:prstGeom>
+                <a:ln w="28575">
+                  <a:headEnd type="none" w="med" len="med"/>
+                  <a:tailEnd type="triangle" w="med" len="med"/>
+                </a:ln>
+              </p:spPr>
+              <p:style>
+                <a:lnRef idx="1">
+                  <a:schemeClr val="accent1"/>
+                </a:lnRef>
+                <a:fillRef idx="0">
+                  <a:schemeClr val="accent1"/>
+                </a:fillRef>
+                <a:effectRef idx="0">
+                  <a:schemeClr val="accent1"/>
+                </a:effectRef>
+                <a:fontRef idx="minor">
+                  <a:schemeClr val="tx1"/>
+                </a:fontRef>
+              </p:style>
+            </p:cxnSp>
+            <p:sp>
+              <p:nvSpPr>
+                <p:cNvPr id="94" name="93 CuadroTexto"/>
+                <p:cNvSpPr txBox="1"/>
+                <p:nvPr/>
+              </p:nvSpPr>
+              <p:spPr>
+                <a:xfrm>
+                  <a:off x="2214546" y="4357694"/>
+                  <a:ext cx="1500198" cy="307777"/>
+                </a:xfrm>
+                <a:prstGeom prst="rect">
+                  <a:avLst/>
+                </a:prstGeom>
+              </p:spPr>
+              <p:style>
+                <a:lnRef idx="2">
+                  <a:schemeClr val="accent1"/>
+                </a:lnRef>
+                <a:fillRef idx="1">
+                  <a:schemeClr val="lt1"/>
+                </a:fillRef>
+                <a:effectRef idx="0">
+                  <a:schemeClr val="accent1"/>
+                </a:effectRef>
+                <a:fontRef idx="minor">
+                  <a:schemeClr val="dk1"/>
+                </a:fontRef>
+              </p:style>
+              <p:txBody>
+                <a:bodyPr wrap="square" rtlCol="0">
+                  <a:spAutoFit/>
+                </a:bodyPr>
+                <a:lstStyle/>
+                <a:p>
+                  <a:pPr algn="ctr"/>
+                  <a:r>
+                    <a:rPr lang="es-ES" sz="1400" dirty="0" smtClean="0"/>
+                    <a:t>Emisor</a:t>
+                  </a:r>
+                </a:p>
+              </p:txBody>
+            </p:sp>
+            <p:sp>
+              <p:nvSpPr>
+                <p:cNvPr id="95" name="94 CuadroTexto"/>
+                <p:cNvSpPr txBox="1"/>
+                <p:nvPr/>
+              </p:nvSpPr>
+              <p:spPr>
+                <a:xfrm>
+                  <a:off x="2214546" y="4643445"/>
+                  <a:ext cx="1500198" cy="107722"/>
+                </a:xfrm>
+                <a:prstGeom prst="rect">
+                  <a:avLst/>
+                </a:prstGeom>
+              </p:spPr>
+              <p:style>
+                <a:lnRef idx="2">
+                  <a:schemeClr val="accent1"/>
+                </a:lnRef>
+                <a:fillRef idx="1">
+                  <a:schemeClr val="lt1"/>
+                </a:fillRef>
+                <a:effectRef idx="0">
+                  <a:schemeClr val="accent1"/>
+                </a:effectRef>
+                <a:fontRef idx="minor">
+                  <a:schemeClr val="dk1"/>
+                </a:fontRef>
+              </p:style>
+              <p:txBody>
+                <a:bodyPr wrap="square" rtlCol="0">
+                  <a:spAutoFit/>
+                </a:bodyPr>
+                <a:lstStyle/>
+                <a:p>
+                  <a:endParaRPr lang="es-ES" sz="100" dirty="0"/>
+                </a:p>
+              </p:txBody>
+            </p:sp>
+            <p:sp>
+              <p:nvSpPr>
+                <p:cNvPr id="96" name="95 CuadroTexto"/>
+                <p:cNvSpPr txBox="1"/>
+                <p:nvPr/>
+              </p:nvSpPr>
+              <p:spPr>
+                <a:xfrm>
+                  <a:off x="2214546" y="4714883"/>
+                  <a:ext cx="1500198" cy="253916"/>
+                </a:xfrm>
+                <a:prstGeom prst="rect">
+                  <a:avLst/>
+                </a:prstGeom>
+              </p:spPr>
+              <p:style>
+                <a:lnRef idx="2">
+                  <a:schemeClr val="accent1"/>
+                </a:lnRef>
+                <a:fillRef idx="1">
+                  <a:schemeClr val="lt1"/>
+                </a:fillRef>
+                <a:effectRef idx="0">
+                  <a:schemeClr val="accent1"/>
+                </a:effectRef>
+                <a:fontRef idx="minor">
+                  <a:schemeClr val="dk1"/>
+                </a:fontRef>
+              </p:style>
+              <p:txBody>
+                <a:bodyPr wrap="square" rtlCol="0">
+                  <a:spAutoFit/>
+                </a:bodyPr>
+                <a:lstStyle/>
+                <a:p>
+                  <a:r>
+                    <a:rPr lang="es-ES" sz="1050" dirty="0" smtClean="0"/>
+                    <a:t>+</a:t>
+                  </a:r>
+                  <a:r>
+                    <a:rPr lang="es-ES" sz="1050" dirty="0" err="1" smtClean="0"/>
+                    <a:t>entregar_carga</a:t>
+                  </a:r>
+                  <a:r>
+                    <a:rPr lang="es-ES" sz="1050" dirty="0" smtClean="0"/>
+                    <a:t>()</a:t>
+                  </a:r>
+                  <a:endParaRPr lang="es-ES" sz="1050" dirty="0"/>
+                </a:p>
+              </p:txBody>
+            </p:sp>
+            <p:cxnSp>
+              <p:nvCxnSpPr>
+                <p:cNvPr id="97" name="96 Conector angular"/>
+                <p:cNvCxnSpPr>
+                  <a:stCxn id="94" idx="0"/>
+                  <a:endCxn id="89" idx="2"/>
+                </p:cNvCxnSpPr>
+                <p:nvPr/>
+              </p:nvCxnSpPr>
+              <p:spPr>
+                <a:xfrm rot="16200000" flipV="1">
+                  <a:off x="2273913" y="3666962"/>
+                  <a:ext cx="524208" cy="857256"/>
+                </a:xfrm>
+                <a:prstGeom prst="bentConnector3">
+                  <a:avLst>
+                    <a:gd name="adj1" fmla="val 50000"/>
+                  </a:avLst>
+                </a:prstGeom>
+                <a:ln w="28575">
+                  <a:headEnd type="none" w="med" len="med"/>
+                  <a:tailEnd type="triangle" w="med" len="med"/>
+                </a:ln>
+              </p:spPr>
+              <p:style>
+                <a:lnRef idx="1">
+                  <a:schemeClr val="accent1"/>
+                </a:lnRef>
+                <a:fillRef idx="0">
+                  <a:schemeClr val="accent1"/>
+                </a:fillRef>
+                <a:effectRef idx="0">
+                  <a:schemeClr val="accent1"/>
+                </a:effectRef>
+                <a:fontRef idx="minor">
+                  <a:schemeClr val="tx1"/>
+                </a:fontRef>
+              </p:style>
+            </p:cxnSp>
+            <p:sp>
+              <p:nvSpPr>
+                <p:cNvPr id="98" name="97 CuadroTexto"/>
+                <p:cNvSpPr txBox="1"/>
+                <p:nvPr/>
+              </p:nvSpPr>
+              <p:spPr>
+                <a:xfrm>
+                  <a:off x="3857620" y="4357694"/>
+                  <a:ext cx="1285884" cy="307777"/>
+                </a:xfrm>
+                <a:prstGeom prst="rect">
+                  <a:avLst/>
+                </a:prstGeom>
+              </p:spPr>
+              <p:style>
+                <a:lnRef idx="2">
+                  <a:schemeClr val="accent1"/>
+                </a:lnRef>
+                <a:fillRef idx="1">
+                  <a:schemeClr val="lt1"/>
+                </a:fillRef>
+                <a:effectRef idx="0">
+                  <a:schemeClr val="accent1"/>
+                </a:effectRef>
+                <a:fontRef idx="minor">
+                  <a:schemeClr val="dk1"/>
+                </a:fontRef>
+              </p:style>
+              <p:txBody>
+                <a:bodyPr wrap="square" rtlCol="0">
+                  <a:spAutoFit/>
+                </a:bodyPr>
+                <a:lstStyle/>
+                <a:p>
+                  <a:pPr algn="ctr"/>
+                  <a:r>
+                    <a:rPr lang="es-ES" sz="1400" dirty="0" smtClean="0"/>
+                    <a:t>Receptor</a:t>
+                  </a:r>
+                </a:p>
+              </p:txBody>
+            </p:sp>
+            <p:sp>
+              <p:nvSpPr>
+                <p:cNvPr id="99" name="98 CuadroTexto"/>
+                <p:cNvSpPr txBox="1"/>
+                <p:nvPr/>
+              </p:nvSpPr>
+              <p:spPr>
+                <a:xfrm>
+                  <a:off x="3857620" y="4643446"/>
+                  <a:ext cx="1285884" cy="107722"/>
+                </a:xfrm>
+                <a:prstGeom prst="rect">
+                  <a:avLst/>
+                </a:prstGeom>
+              </p:spPr>
+              <p:style>
+                <a:lnRef idx="2">
+                  <a:schemeClr val="accent1"/>
+                </a:lnRef>
+                <a:fillRef idx="1">
+                  <a:schemeClr val="lt1"/>
+                </a:fillRef>
+                <a:effectRef idx="0">
+                  <a:schemeClr val="accent1"/>
+                </a:effectRef>
+                <a:fontRef idx="minor">
+                  <a:schemeClr val="dk1"/>
+                </a:fontRef>
+              </p:style>
+              <p:txBody>
+                <a:bodyPr wrap="square" rtlCol="0">
+                  <a:spAutoFit/>
+                </a:bodyPr>
+                <a:lstStyle/>
+                <a:p>
+                  <a:endParaRPr lang="es-ES" sz="100" dirty="0"/>
+                </a:p>
+              </p:txBody>
+            </p:sp>
+            <p:sp>
+              <p:nvSpPr>
+                <p:cNvPr id="100" name="99 CuadroTexto"/>
+                <p:cNvSpPr txBox="1"/>
+                <p:nvPr/>
+              </p:nvSpPr>
+              <p:spPr>
+                <a:xfrm>
+                  <a:off x="3857620" y="4714884"/>
+                  <a:ext cx="1285884" cy="261610"/>
+                </a:xfrm>
+                <a:prstGeom prst="rect">
+                  <a:avLst/>
+                </a:prstGeom>
+              </p:spPr>
+              <p:style>
+                <a:lnRef idx="2">
+                  <a:schemeClr val="accent1"/>
+                </a:lnRef>
+                <a:fillRef idx="1">
+                  <a:schemeClr val="lt1"/>
+                </a:fillRef>
+                <a:effectRef idx="0">
+                  <a:schemeClr val="accent1"/>
+                </a:effectRef>
+                <a:fontRef idx="minor">
+                  <a:schemeClr val="dk1"/>
+                </a:fontRef>
+              </p:style>
+              <p:txBody>
+                <a:bodyPr wrap="square" rtlCol="0">
+                  <a:spAutoFit/>
+                </a:bodyPr>
+                <a:lstStyle/>
+                <a:p>
+                  <a:r>
+                    <a:rPr lang="es-ES" sz="1050" dirty="0" smtClean="0"/>
+                    <a:t>+</a:t>
+                  </a:r>
+                  <a:r>
+                    <a:rPr lang="es-ES" sz="1050" dirty="0" err="1" smtClean="0"/>
+                    <a:t>recibir_carga</a:t>
+                  </a:r>
+                  <a:r>
+                    <a:rPr lang="es-ES" sz="1050" dirty="0" smtClean="0"/>
+                    <a:t>()</a:t>
+                  </a:r>
+                  <a:endParaRPr lang="es-ES" sz="1050" dirty="0"/>
+                </a:p>
+              </p:txBody>
+            </p:sp>
+            <p:sp>
+              <p:nvSpPr>
+                <p:cNvPr id="102" name="101 Nube"/>
+                <p:cNvSpPr/>
+                <p:nvPr/>
+              </p:nvSpPr>
+              <p:spPr>
+                <a:xfrm>
+                  <a:off x="3357554" y="2928934"/>
+                  <a:ext cx="1571636" cy="857256"/>
+                </a:xfrm>
+                <a:prstGeom prst="cloud">
+                  <a:avLst/>
+                </a:prstGeom>
+              </p:spPr>
+              <p:style>
+                <a:lnRef idx="2">
+                  <a:schemeClr val="accent1"/>
+                </a:lnRef>
+                <a:fillRef idx="1">
+                  <a:schemeClr val="lt1"/>
+                </a:fillRef>
+                <a:effectRef idx="0">
+                  <a:schemeClr val="accent1"/>
+                </a:effectRef>
+                <a:fontRef idx="minor">
+                  <a:schemeClr val="dk1"/>
+                </a:fontRef>
+              </p:style>
+              <p:txBody>
+                <a:bodyPr rtlCol="0" anchor="ctr"/>
+                <a:lstStyle/>
+                <a:p>
+                  <a:pPr algn="ctr"/>
+                  <a:r>
+                    <a:rPr lang="es-ES" sz="1400" dirty="0" smtClean="0"/>
+                    <a:t>Resto del sistema</a:t>
+                  </a:r>
+                  <a:endParaRPr lang="es-ES" sz="1400" dirty="0"/>
+                </a:p>
+              </p:txBody>
+            </p:sp>
+            <p:cxnSp>
+              <p:nvCxnSpPr>
+                <p:cNvPr id="103" name="102 Conector recto"/>
+                <p:cNvCxnSpPr>
+                  <a:stCxn id="102" idx="2"/>
+                  <a:endCxn id="88" idx="3"/>
+                </p:cNvCxnSpPr>
+                <p:nvPr/>
+              </p:nvCxnSpPr>
+              <p:spPr>
+                <a:xfrm rot="10800000" flipV="1">
+                  <a:off x="2857489" y="3357561"/>
+                  <a:ext cx="504941" cy="82451"/>
+                </a:xfrm>
+                <a:prstGeom prst="line">
+                  <a:avLst/>
+                </a:prstGeom>
+                <a:ln w="28575"/>
+              </p:spPr>
+              <p:style>
+                <a:lnRef idx="1">
+                  <a:schemeClr val="accent1"/>
+                </a:lnRef>
+                <a:fillRef idx="0">
+                  <a:schemeClr val="accent1"/>
+                </a:fillRef>
+                <a:effectRef idx="0">
+                  <a:schemeClr val="accent1"/>
+                </a:effectRef>
+                <a:fontRef idx="minor">
+                  <a:schemeClr val="tx1"/>
+                </a:fontRef>
+              </p:style>
+            </p:cxnSp>
+          </p:grpSp>
+          <p:sp>
+            <p:nvSpPr>
+              <p:cNvPr id="105" name="104 CuadroTexto"/>
+              <p:cNvSpPr txBox="1"/>
+              <p:nvPr/>
+            </p:nvSpPr>
+            <p:spPr>
+              <a:xfrm>
+                <a:off x="2428860" y="5000636"/>
+                <a:ext cx="1107226" cy="307777"/>
+              </a:xfrm>
+              <a:prstGeom prst="rect">
+                <a:avLst/>
+              </a:prstGeom>
+              <a:noFill/>
+            </p:spPr>
+            <p:txBody>
+              <a:bodyPr wrap="none" rtlCol="0">
+                <a:spAutoFit/>
+              </a:bodyPr>
+              <a:lstStyle/>
+              <a:p>
+                <a:r>
+                  <a:rPr lang="es-ES" sz="1400" u="sng" dirty="0" smtClean="0"/>
+                  <a:t>Versión -1</a:t>
+                </a:r>
+                <a:endParaRPr lang="es-ES" sz="1400" u="sng" dirty="0"/>
+              </a:p>
+            </p:txBody>
+          </p:sp>
+        </p:grpSp>
+      </p:grpSp>
+      <p:grpSp>
+        <p:nvGrpSpPr>
+          <p:cNvPr id="124" name="123 Grupo"/>
+          <p:cNvGrpSpPr/>
+          <p:nvPr/>
+        </p:nvGrpSpPr>
+        <p:grpSpPr>
+          <a:xfrm>
+            <a:off x="6143636" y="2857496"/>
+            <a:ext cx="2016129" cy="2522355"/>
+            <a:chOff x="6143636" y="2857496"/>
+            <a:chExt cx="2016129" cy="2522355"/>
+          </a:xfrm>
+        </p:grpSpPr>
+        <p:sp>
+          <p:nvSpPr>
+            <p:cNvPr id="107" name="106 CuadroTexto"/>
+            <p:cNvSpPr txBox="1"/>
+            <p:nvPr/>
+          </p:nvSpPr>
+          <p:spPr>
+            <a:xfrm>
+              <a:off x="6429388" y="3929066"/>
+              <a:ext cx="1500198" cy="307777"/>
+            </a:xfrm>
+            <a:prstGeom prst="rect">
+              <a:avLst/>
+            </a:prstGeom>
+          </p:spPr>
+          <p:style>
+            <a:lnRef idx="2">
+              <a:schemeClr val="accent1"/>
+            </a:lnRef>
+            <a:fillRef idx="1">
+              <a:schemeClr val="lt1"/>
+            </a:fillRef>
+            <a:effectRef idx="0">
+              <a:schemeClr val="accent1"/>
+            </a:effectRef>
+            <a:fontRef idx="minor">
+              <a:schemeClr val="dk1"/>
+            </a:fontRef>
+          </p:style>
+          <p:txBody>
+            <a:bodyPr wrap="square" rtlCol="0">
+              <a:spAutoFit/>
+            </a:bodyPr>
+            <a:lstStyle/>
+            <a:p>
+              <a:pPr algn="ctr"/>
+              <a:r>
+                <a:rPr lang="es-ES" sz="1400" dirty="0" smtClean="0"/>
+                <a:t>Cliente</a:t>
+              </a:r>
+            </a:p>
+          </p:txBody>
+        </p:sp>
+        <p:sp>
+          <p:nvSpPr>
+            <p:cNvPr id="108" name="107 CuadroTexto"/>
+            <p:cNvSpPr txBox="1"/>
+            <p:nvPr/>
+          </p:nvSpPr>
+          <p:spPr>
+            <a:xfrm>
+              <a:off x="6429356" y="4214811"/>
+              <a:ext cx="1500198" cy="297082"/>
+            </a:xfrm>
+            <a:prstGeom prst="rect">
+              <a:avLst/>
+            </a:prstGeom>
+          </p:spPr>
+          <p:style>
+            <a:lnRef idx="2">
+              <a:schemeClr val="accent1"/>
+            </a:lnRef>
+            <a:fillRef idx="1">
+              <a:schemeClr val="lt1"/>
+            </a:fillRef>
+            <a:effectRef idx="0">
+              <a:schemeClr val="accent1"/>
+            </a:effectRef>
+            <a:fontRef idx="minor">
+              <a:schemeClr val="dk1"/>
+            </a:fontRef>
+          </p:style>
+          <p:txBody>
+            <a:bodyPr wrap="square" rtlCol="0">
+              <a:spAutoFit/>
+            </a:bodyPr>
+            <a:lstStyle/>
+            <a:p>
+              <a:r>
+                <a:rPr lang="es-ES" sz="1050" dirty="0" smtClean="0"/>
+                <a:t>-</a:t>
+              </a:r>
+              <a:r>
+                <a:rPr lang="es-ES" sz="1050" dirty="0" err="1" smtClean="0"/>
+                <a:t>datos_cliente</a:t>
+              </a:r>
+              <a:endParaRPr lang="es-ES" sz="1050" dirty="0"/>
+            </a:p>
+          </p:txBody>
+        </p:sp>
+        <p:sp>
+          <p:nvSpPr>
+            <p:cNvPr id="109" name="108 Nube"/>
+            <p:cNvSpPr/>
+            <p:nvPr/>
+          </p:nvSpPr>
+          <p:spPr>
+            <a:xfrm>
+              <a:off x="6500826" y="2857496"/>
+              <a:ext cx="1571636" cy="857256"/>
+            </a:xfrm>
+            <a:prstGeom prst="cloud">
+              <a:avLst/>
+            </a:prstGeom>
+          </p:spPr>
+          <p:style>
+            <a:lnRef idx="2">
+              <a:schemeClr val="accent1"/>
+            </a:lnRef>
+            <a:fillRef idx="1">
+              <a:schemeClr val="lt1"/>
+            </a:fillRef>
+            <a:effectRef idx="0">
+              <a:schemeClr val="accent1"/>
+            </a:effectRef>
+            <a:fontRef idx="minor">
+              <a:schemeClr val="dk1"/>
+            </a:fontRef>
+          </p:style>
+          <p:txBody>
+            <a:bodyPr rtlCol="0" anchor="ctr"/>
+            <a:lstStyle/>
+            <a:p>
+              <a:pPr algn="ctr"/>
+              <a:r>
+                <a:rPr lang="es-ES" sz="1400" dirty="0" smtClean="0"/>
+                <a:t>Resto del sistema</a:t>
+              </a:r>
+              <a:endParaRPr lang="es-ES" sz="1400" dirty="0"/>
+            </a:p>
+          </p:txBody>
+        </p:sp>
+        <p:cxnSp>
+          <p:nvCxnSpPr>
+            <p:cNvPr id="110" name="109 Conector recto"/>
+            <p:cNvCxnSpPr>
+              <a:stCxn id="109" idx="1"/>
+              <a:endCxn id="107" idx="0"/>
+            </p:cNvCxnSpPr>
+            <p:nvPr/>
+          </p:nvCxnSpPr>
+          <p:spPr>
+            <a:xfrm rot="5400000">
+              <a:off x="7125453" y="3767874"/>
+              <a:ext cx="215227" cy="107157"/>
+            </a:xfrm>
+            <a:prstGeom prst="line">
+              <a:avLst/>
+            </a:prstGeom>
+            <a:ln w="28575"/>
+          </p:spPr>
+          <p:style>
+            <a:lnRef idx="1">
+              <a:schemeClr val="accent1"/>
+            </a:lnRef>
+            <a:fillRef idx="0">
+              <a:schemeClr val="accent1"/>
+            </a:fillRef>
+            <a:effectRef idx="0">
+              <a:schemeClr val="accent1"/>
+            </a:effectRef>
+            <a:fontRef idx="minor">
+              <a:schemeClr val="tx1"/>
+            </a:fontRef>
+          </p:style>
+        </p:cxnSp>
+        <p:sp>
+          <p:nvSpPr>
+            <p:cNvPr id="119" name="118 CuadroTexto"/>
+            <p:cNvSpPr txBox="1"/>
+            <p:nvPr/>
+          </p:nvSpPr>
+          <p:spPr>
+            <a:xfrm>
+              <a:off x="6429388" y="4500570"/>
+              <a:ext cx="1500198" cy="577081"/>
+            </a:xfrm>
+            <a:prstGeom prst="rect">
+              <a:avLst/>
+            </a:prstGeom>
+          </p:spPr>
+          <p:style>
+            <a:lnRef idx="2">
+              <a:schemeClr val="accent1"/>
+            </a:lnRef>
+            <a:fillRef idx="1">
+              <a:schemeClr val="lt1"/>
+            </a:fillRef>
+            <a:effectRef idx="0">
+              <a:schemeClr val="accent1"/>
+            </a:effectRef>
+            <a:fontRef idx="minor">
+              <a:schemeClr val="dk1"/>
+            </a:fontRef>
+          </p:style>
+          <p:txBody>
+            <a:bodyPr wrap="square" rtlCol="0">
+              <a:spAutoFit/>
+            </a:bodyPr>
+            <a:lstStyle/>
+            <a:p>
+              <a:r>
+                <a:rPr lang="es-ES" sz="1050" dirty="0" smtClean="0"/>
+                <a:t>+</a:t>
+              </a:r>
+              <a:r>
+                <a:rPr lang="es-ES" sz="1050" dirty="0" err="1" smtClean="0"/>
+                <a:t>pagar_servicio</a:t>
+              </a:r>
+              <a:r>
+                <a:rPr lang="es-ES" sz="1050" dirty="0" smtClean="0"/>
+                <a:t>()</a:t>
+              </a:r>
+            </a:p>
+            <a:p>
+              <a:r>
+                <a:rPr lang="es-ES" sz="1050" dirty="0" smtClean="0"/>
+                <a:t>+</a:t>
+              </a:r>
+              <a:r>
+                <a:rPr lang="es-ES" sz="1050" dirty="0" err="1" smtClean="0"/>
+                <a:t>entregar_carga</a:t>
+              </a:r>
+              <a:r>
+                <a:rPr lang="es-ES" sz="1050" dirty="0" smtClean="0"/>
+                <a:t>()</a:t>
+              </a:r>
+            </a:p>
+            <a:p>
+              <a:r>
+                <a:rPr lang="es-ES" sz="1050" dirty="0" smtClean="0"/>
+                <a:t>+</a:t>
+              </a:r>
+              <a:r>
+                <a:rPr lang="es-ES" sz="1050" dirty="0" err="1" smtClean="0"/>
+                <a:t>recibir_carga</a:t>
+              </a:r>
+              <a:r>
+                <a:rPr lang="es-ES" sz="1050" dirty="0" smtClean="0"/>
+                <a:t>()</a:t>
+              </a:r>
+              <a:endParaRPr lang="es-ES" sz="1050" dirty="0"/>
+            </a:p>
+          </p:txBody>
+        </p:sp>
+        <p:sp>
+          <p:nvSpPr>
+            <p:cNvPr id="123" name="122 CuadroTexto"/>
+            <p:cNvSpPr txBox="1"/>
+            <p:nvPr/>
+          </p:nvSpPr>
+          <p:spPr>
+            <a:xfrm>
+              <a:off x="6143636" y="5072074"/>
+              <a:ext cx="2016129" cy="307777"/>
+            </a:xfrm>
+            <a:prstGeom prst="rect">
+              <a:avLst/>
+            </a:prstGeom>
+            <a:noFill/>
+          </p:spPr>
+          <p:txBody>
+            <a:bodyPr wrap="none" rtlCol="0">
+              <a:spAutoFit/>
+            </a:bodyPr>
+            <a:lstStyle/>
+            <a:p>
+              <a:r>
+                <a:rPr lang="es-ES" sz="1400" u="sng" dirty="0" smtClean="0"/>
+                <a:t>Versión </a:t>
+              </a:r>
+              <a:r>
+                <a:rPr lang="es-ES" sz="1400" u="sng" dirty="0" err="1" smtClean="0"/>
+                <a:t>remaster</a:t>
+              </a:r>
+              <a:r>
+                <a:rPr lang="es-ES" sz="1400" u="sng" dirty="0" smtClean="0"/>
+                <a:t> 09</a:t>
+              </a:r>
+              <a:endParaRPr lang="es-ES" sz="1400" u="sng" dirty="0"/>
+            </a:p>
+          </p:txBody>
+        </p:sp>
+      </p:grpSp>
+      <p:sp>
+        <p:nvSpPr>
+          <p:cNvPr id="127" name="126 Flecha derecha"/>
+          <p:cNvSpPr/>
+          <p:nvPr/>
+        </p:nvSpPr>
+        <p:spPr>
+          <a:xfrm>
+            <a:off x="5143504" y="3786190"/>
+            <a:ext cx="785818" cy="500066"/>
+          </a:xfrm>
+          <a:prstGeom prst="rightArrow">
+            <a:avLst/>
+          </a:prstGeom>
+        </p:spPr>
+        <p:style>
+          <a:lnRef idx="2">
+            <a:schemeClr val="accent1">
+              <a:shade val="50000"/>
+            </a:schemeClr>
+          </a:lnRef>
+          <a:fillRef idx="1">
+            <a:schemeClr val="accent1"/>
+          </a:fillRef>
+          <a:effectRef idx="0">
+            <a:schemeClr val="accent1"/>
+          </a:effectRef>
+          <a:fontRef idx="minor">
+            <a:schemeClr val="lt1"/>
+          </a:fontRef>
+        </p:style>
+        <p:txBody>
+          <a:bodyPr rtlCol="0" anchor="ctr"/>
+          <a:lstStyle/>
+          <a:p>
+            <a:pPr algn="ctr"/>
+            <a:endParaRPr lang="es-ES"/>
           </a:p>
         </p:txBody>
       </p:sp>
@@ -5378,12 +6435,180 @@
   <p:clrMapOvr>
     <a:masterClrMapping/>
   </p:clrMapOvr>
+  <p:transition/>
   <p:timing>
     <p:tnLst>
       <p:par>
-        <p:cTn id="1" dur="indefinite" restart="never" nodeType="tmRoot"/>
+        <p:cTn id="1" dur="indefinite" restart="never" nodeType="tmRoot">
+          <p:childTnLst>
+            <p:seq concurrent="1" nextAc="seek">
+              <p:cTn id="2" dur="indefinite" nodeType="mainSeq">
+                <p:childTnLst>
+                  <p:par>
+                    <p:cTn id="3" fill="hold">
+                      <p:stCondLst>
+                        <p:cond delay="indefinite"/>
+                      </p:stCondLst>
+                      <p:childTnLst>
+                        <p:par>
+                          <p:cTn id="4" fill="hold">
+                            <p:stCondLst>
+                              <p:cond delay="0"/>
+                            </p:stCondLst>
+                            <p:childTnLst>
+                              <p:par>
+                                <p:cTn id="5" presetID="10" presetClass="entr" presetSubtype="0" fill="hold" nodeType="clickEffect">
+                                  <p:stCondLst>
+                                    <p:cond delay="0"/>
+                                  </p:stCondLst>
+                                  <p:childTnLst>
+                                    <p:set>
+                                      <p:cBhvr>
+                                        <p:cTn id="6" dur="1" fill="hold">
+                                          <p:stCondLst>
+                                            <p:cond delay="0"/>
+                                          </p:stCondLst>
+                                        </p:cTn>
+                                        <p:tgtEl>
+                                          <p:spTgt spid="129"/>
+                                        </p:tgtEl>
+                                        <p:attrNameLst>
+                                          <p:attrName>style.visibility</p:attrName>
+                                        </p:attrNameLst>
+                                      </p:cBhvr>
+                                      <p:to>
+                                        <p:strVal val="visible"/>
+                                      </p:to>
+                                    </p:set>
+                                    <p:animEffect transition="in" filter="fade">
+                                      <p:cBhvr>
+                                        <p:cTn id="7" dur="2000"/>
+                                        <p:tgtEl>
+                                          <p:spTgt spid="129"/>
+                                        </p:tgtEl>
+                                      </p:cBhvr>
+                                    </p:animEffect>
+                                  </p:childTnLst>
+                                </p:cTn>
+                              </p:par>
+                            </p:childTnLst>
+                          </p:cTn>
+                        </p:par>
+                      </p:childTnLst>
+                    </p:cTn>
+                  </p:par>
+                  <p:par>
+                    <p:cTn id="8" fill="hold">
+                      <p:stCondLst>
+                        <p:cond delay="indefinite"/>
+                      </p:stCondLst>
+                      <p:childTnLst>
+                        <p:par>
+                          <p:cTn id="9" fill="hold">
+                            <p:stCondLst>
+                              <p:cond delay="0"/>
+                            </p:stCondLst>
+                            <p:childTnLst>
+                              <p:par>
+                                <p:cTn id="10" presetID="10" presetClass="entr" presetSubtype="0" fill="hold" nodeType="clickEffect">
+                                  <p:stCondLst>
+                                    <p:cond delay="0"/>
+                                  </p:stCondLst>
+                                  <p:childTnLst>
+                                    <p:set>
+                                      <p:cBhvr>
+                                        <p:cTn id="11" dur="1" fill="hold">
+                                          <p:stCondLst>
+                                            <p:cond delay="0"/>
+                                          </p:stCondLst>
+                                        </p:cTn>
+                                        <p:tgtEl>
+                                          <p:spTgt spid="124"/>
+                                        </p:tgtEl>
+                                        <p:attrNameLst>
+                                          <p:attrName>style.visibility</p:attrName>
+                                        </p:attrNameLst>
+                                      </p:cBhvr>
+                                      <p:to>
+                                        <p:strVal val="visible"/>
+                                      </p:to>
+                                    </p:set>
+                                    <p:animEffect transition="in" filter="fade">
+                                      <p:cBhvr>
+                                        <p:cTn id="12" dur="2000"/>
+                                        <p:tgtEl>
+                                          <p:spTgt spid="124"/>
+                                        </p:tgtEl>
+                                      </p:cBhvr>
+                                    </p:animEffect>
+                                  </p:childTnLst>
+                                </p:cTn>
+                              </p:par>
+                              <p:par>
+                                <p:cTn id="13" presetID="10" presetClass="entr" presetSubtype="0" fill="hold" grpId="0" nodeType="withEffect">
+                                  <p:stCondLst>
+                                    <p:cond delay="0"/>
+                                  </p:stCondLst>
+                                  <p:childTnLst>
+                                    <p:set>
+                                      <p:cBhvr>
+                                        <p:cTn id="14" dur="1" fill="hold">
+                                          <p:stCondLst>
+                                            <p:cond delay="0"/>
+                                          </p:stCondLst>
+                                        </p:cTn>
+                                        <p:tgtEl>
+                                          <p:spTgt spid="127"/>
+                                        </p:tgtEl>
+                                        <p:attrNameLst>
+                                          <p:attrName>style.visibility</p:attrName>
+                                        </p:attrNameLst>
+                                      </p:cBhvr>
+                                      <p:to>
+                                        <p:strVal val="visible"/>
+                                      </p:to>
+                                    </p:set>
+                                    <p:animEffect transition="in" filter="fade">
+                                      <p:cBhvr>
+                                        <p:cTn id="15" dur="2000"/>
+                                        <p:tgtEl>
+                                          <p:spTgt spid="127"/>
+                                        </p:tgtEl>
+                                      </p:cBhvr>
+                                    </p:animEffect>
+                                  </p:childTnLst>
+                                </p:cTn>
+                              </p:par>
+                            </p:childTnLst>
+                          </p:cTn>
+                        </p:par>
+                      </p:childTnLst>
+                    </p:cTn>
+                  </p:par>
+                </p:childTnLst>
+              </p:cTn>
+              <p:prevCondLst>
+                <p:cond evt="onPrev" delay="0">
+                  <p:tgtEl>
+                    <p:sldTgt/>
+                  </p:tgtEl>
+                </p:cond>
+              </p:prevCondLst>
+              <p:nextCondLst>
+                <p:cond evt="onNext" delay="0">
+                  <p:tgtEl>
+                    <p:sldTgt/>
+                  </p:tgtEl>
+                </p:cond>
+              </p:nextCondLst>
+            </p:seq>
+          </p:childTnLst>
+        </p:cTn>
       </p:par>
     </p:tnLst>
+    <p:bldLst>
+      <p:bldP spid="127" grpId="0" animBg="1"/>
+    </p:bldLst>
   </p:timing>
 </p:sld>
 </file>

</xml_diff>